<commit_message>
Improvements in Workshop 1
</commit_message>
<xml_diff>
--- a/1/presentation/Angular 1.pptx
+++ b/1/presentation/Angular 1.pptx
@@ -5,7 +5,7 @@
     <p:sldMasterId id="2147483648" r:id="rId1"/>
   </p:sldMasterIdLst>
   <p:notesMasterIdLst>
-    <p:notesMasterId r:id="rId32"/>
+    <p:notesMasterId r:id="rId33"/>
   </p:notesMasterIdLst>
   <p:sldIdLst>
     <p:sldId id="256" r:id="rId2"/>
@@ -38,6 +38,7 @@
     <p:sldId id="316" r:id="rId29"/>
     <p:sldId id="287" r:id="rId30"/>
     <p:sldId id="288" r:id="rId31"/>
+    <p:sldId id="317" r:id="rId32"/>
   </p:sldIdLst>
   <p:sldSz cx="12192000" cy="6858000"/>
   <p:notesSz cx="6858000" cy="9144000"/>
@@ -20100,7 +20101,7 @@
           <a:p>
             <a:fld id="{A7D59A82-B575-4226-8A09-A5B072479177}" type="datetimeFigureOut">
               <a:rPr lang="pl-PL" smtClean="0"/>
-              <a:t>28.10.2020</a:t>
+              <a:t>05.11.2020</a:t>
             </a:fld>
             <a:endParaRPr lang="pl-PL"/>
           </a:p>
@@ -21037,6 +21038,90 @@
 </p:notes>
 </file>
 
+<file path=ppt/notesSlides/notesSlide16.xml><?xml version="1.0" encoding="utf-8"?>
+<p:notes xmlns:a="http://schemas.openxmlformats.org/drawingml/2006/main" xmlns:r="http://schemas.openxmlformats.org/officeDocument/2006/relationships" xmlns:p="http://schemas.openxmlformats.org/presentationml/2006/main">
+  <p:cSld>
+    <p:spTree>
+      <p:nvGrpSpPr>
+        <p:cNvPr id="1" name=""/>
+        <p:cNvGrpSpPr/>
+        <p:nvPr/>
+      </p:nvGrpSpPr>
+      <p:grpSpPr>
+        <a:xfrm>
+          <a:off x="0" y="0"/>
+          <a:ext cx="0" cy="0"/>
+          <a:chOff x="0" y="0"/>
+          <a:chExt cx="0" cy="0"/>
+        </a:xfrm>
+      </p:grpSpPr>
+      <p:sp>
+        <p:nvSpPr>
+          <p:cNvPr id="2" name="Slide Image Placeholder 1"/>
+          <p:cNvSpPr>
+            <a:spLocks noGrp="1" noRot="1" noChangeAspect="1"/>
+          </p:cNvSpPr>
+          <p:nvPr>
+            <p:ph type="sldImg"/>
+          </p:nvPr>
+        </p:nvSpPr>
+        <p:spPr/>
+      </p:sp>
+      <p:sp>
+        <p:nvSpPr>
+          <p:cNvPr id="3" name="Notes Placeholder 2"/>
+          <p:cNvSpPr>
+            <a:spLocks noGrp="1"/>
+          </p:cNvSpPr>
+          <p:nvPr>
+            <p:ph type="body" idx="1"/>
+          </p:nvPr>
+        </p:nvSpPr>
+        <p:spPr/>
+        <p:txBody>
+          <a:bodyPr/>
+          <a:lstStyle/>
+          <a:p>
+            <a:endParaRPr lang="pl-PL" dirty="0"/>
+          </a:p>
+        </p:txBody>
+      </p:sp>
+      <p:sp>
+        <p:nvSpPr>
+          <p:cNvPr id="4" name="Slide Number Placeholder 3"/>
+          <p:cNvSpPr>
+            <a:spLocks noGrp="1"/>
+          </p:cNvSpPr>
+          <p:nvPr>
+            <p:ph type="sldNum" sz="quarter" idx="5"/>
+          </p:nvPr>
+        </p:nvSpPr>
+        <p:spPr/>
+        <p:txBody>
+          <a:bodyPr/>
+          <a:lstStyle/>
+          <a:p>
+            <a:fld id="{F89D2610-1426-4EFD-83D2-2399D4353A5D}" type="slidenum">
+              <a:rPr lang="pl-PL" smtClean="0"/>
+              <a:t>31</a:t>
+            </a:fld>
+            <a:endParaRPr lang="pl-PL"/>
+          </a:p>
+        </p:txBody>
+      </p:sp>
+    </p:spTree>
+    <p:extLst>
+      <p:ext uri="{BB962C8B-B14F-4D97-AF65-F5344CB8AC3E}">
+        <p14:creationId xmlns:p14="http://schemas.microsoft.com/office/powerpoint/2010/main" val="3283617547"/>
+      </p:ext>
+    </p:extLst>
+  </p:cSld>
+  <p:clrMapOvr>
+    <a:masterClrMapping/>
+  </p:clrMapOvr>
+</p:notes>
+</file>
+
 <file path=ppt/notesSlides/notesSlide2.xml><?xml version="1.0" encoding="utf-8"?>
 <p:notes xmlns:a="http://schemas.openxmlformats.org/drawingml/2006/main" xmlns:r="http://schemas.openxmlformats.org/officeDocument/2006/relationships" xmlns:p="http://schemas.openxmlformats.org/presentationml/2006/main">
   <p:cSld>
@@ -22034,7 +22119,7 @@
           <a:p>
             <a:fld id="{5E543113-3ECC-4DC9-B636-16B32516798D}" type="datetimeFigureOut">
               <a:rPr lang="pl-PL" smtClean="0"/>
-              <a:t>28.10.2020</a:t>
+              <a:t>05.11.2020</a:t>
             </a:fld>
             <a:endParaRPr lang="pl-PL"/>
           </a:p>
@@ -22234,7 +22319,7 @@
           <a:p>
             <a:fld id="{5E543113-3ECC-4DC9-B636-16B32516798D}" type="datetimeFigureOut">
               <a:rPr lang="pl-PL" smtClean="0"/>
-              <a:t>28.10.2020</a:t>
+              <a:t>05.11.2020</a:t>
             </a:fld>
             <a:endParaRPr lang="pl-PL"/>
           </a:p>
@@ -22444,7 +22529,7 @@
           <a:p>
             <a:fld id="{5E543113-3ECC-4DC9-B636-16B32516798D}" type="datetimeFigureOut">
               <a:rPr lang="pl-PL" smtClean="0"/>
-              <a:t>28.10.2020</a:t>
+              <a:t>05.11.2020</a:t>
             </a:fld>
             <a:endParaRPr lang="pl-PL"/>
           </a:p>
@@ -22644,7 +22729,7 @@
           <a:p>
             <a:fld id="{5E543113-3ECC-4DC9-B636-16B32516798D}" type="datetimeFigureOut">
               <a:rPr lang="pl-PL" smtClean="0"/>
-              <a:t>28.10.2020</a:t>
+              <a:t>05.11.2020</a:t>
             </a:fld>
             <a:endParaRPr lang="pl-PL"/>
           </a:p>
@@ -22920,7 +23005,7 @@
           <a:p>
             <a:fld id="{5E543113-3ECC-4DC9-B636-16B32516798D}" type="datetimeFigureOut">
               <a:rPr lang="pl-PL" smtClean="0"/>
-              <a:t>28.10.2020</a:t>
+              <a:t>05.11.2020</a:t>
             </a:fld>
             <a:endParaRPr lang="pl-PL"/>
           </a:p>
@@ -23188,7 +23273,7 @@
           <a:p>
             <a:fld id="{5E543113-3ECC-4DC9-B636-16B32516798D}" type="datetimeFigureOut">
               <a:rPr lang="pl-PL" smtClean="0"/>
-              <a:t>28.10.2020</a:t>
+              <a:t>05.11.2020</a:t>
             </a:fld>
             <a:endParaRPr lang="pl-PL"/>
           </a:p>
@@ -23603,7 +23688,7 @@
           <a:p>
             <a:fld id="{5E543113-3ECC-4DC9-B636-16B32516798D}" type="datetimeFigureOut">
               <a:rPr lang="pl-PL" smtClean="0"/>
-              <a:t>28.10.2020</a:t>
+              <a:t>05.11.2020</a:t>
             </a:fld>
             <a:endParaRPr lang="pl-PL"/>
           </a:p>
@@ -23745,7 +23830,7 @@
           <a:p>
             <a:fld id="{5E543113-3ECC-4DC9-B636-16B32516798D}" type="datetimeFigureOut">
               <a:rPr lang="pl-PL" smtClean="0"/>
-              <a:t>28.10.2020</a:t>
+              <a:t>05.11.2020</a:t>
             </a:fld>
             <a:endParaRPr lang="pl-PL"/>
           </a:p>
@@ -23858,7 +23943,7 @@
           <a:p>
             <a:fld id="{5E543113-3ECC-4DC9-B636-16B32516798D}" type="datetimeFigureOut">
               <a:rPr lang="pl-PL" smtClean="0"/>
-              <a:t>28.10.2020</a:t>
+              <a:t>05.11.2020</a:t>
             </a:fld>
             <a:endParaRPr lang="pl-PL"/>
           </a:p>
@@ -24171,7 +24256,7 @@
           <a:p>
             <a:fld id="{5E543113-3ECC-4DC9-B636-16B32516798D}" type="datetimeFigureOut">
               <a:rPr lang="pl-PL" smtClean="0"/>
-              <a:t>28.10.2020</a:t>
+              <a:t>05.11.2020</a:t>
             </a:fld>
             <a:endParaRPr lang="pl-PL"/>
           </a:p>
@@ -24460,7 +24545,7 @@
           <a:p>
             <a:fld id="{5E543113-3ECC-4DC9-B636-16B32516798D}" type="datetimeFigureOut">
               <a:rPr lang="pl-PL" smtClean="0"/>
-              <a:t>28.10.2020</a:t>
+              <a:t>05.11.2020</a:t>
             </a:fld>
             <a:endParaRPr lang="pl-PL"/>
           </a:p>
@@ -24703,7 +24788,7 @@
           <a:p>
             <a:fld id="{5E543113-3ECC-4DC9-B636-16B32516798D}" type="datetimeFigureOut">
               <a:rPr lang="pl-PL" smtClean="0"/>
-              <a:t>28.10.2020</a:t>
+              <a:t>05.11.2020</a:t>
             </a:fld>
             <a:endParaRPr lang="pl-PL"/>
           </a:p>
@@ -34505,8 +34590,12 @@
               </a:spcAft>
             </a:pPr>
             <a:r>
+              <a:rPr lang="pl-PL" sz="3600" dirty="0" err="1"/>
+              <a:t>templateUrl</a:t>
+            </a:r>
+            <a:r>
               <a:rPr lang="pl-PL" sz="3600" dirty="0"/>
-              <a:t>templateUrl:[’./product-list.component.html’]</a:t>
+              <a:t>:’./heroes-list.component.html’</a:t>
             </a:r>
             <a:endParaRPr lang="en-US" sz="3600" kern="1200" dirty="0"/>
           </a:p>
@@ -34958,7 +35047,7 @@
             <a:pPr algn="ctr"/>
             <a:r>
               <a:rPr lang="pl-PL" dirty="0"/>
-              <a:t>Lista produktów (komponent)</a:t>
+              <a:t>Lista herosów (komponent)</a:t>
             </a:r>
           </a:p>
         </p:txBody>
@@ -35542,7 +35631,71 @@
                   <a:srgbClr val="FF0000"/>
                 </a:solidFill>
               </a:rPr>
-              <a:t>&lt;app-products&gt;&lt;/app-products&gt;</a:t>
+              <a:t>&lt;</a:t>
+            </a:r>
+            <a:r>
+              <a:rPr lang="pl-PL" sz="2800" dirty="0" err="1">
+                <a:solidFill>
+                  <a:srgbClr val="FF0000"/>
+                </a:solidFill>
+              </a:rPr>
+              <a:t>app</a:t>
+            </a:r>
+            <a:r>
+              <a:rPr lang="pl-PL" sz="2800" dirty="0">
+                <a:solidFill>
+                  <a:srgbClr val="FF0000"/>
+                </a:solidFill>
+              </a:rPr>
+              <a:t>-</a:t>
+            </a:r>
+            <a:r>
+              <a:rPr lang="pl-PL" sz="2800" dirty="0" err="1">
+                <a:solidFill>
+                  <a:srgbClr val="FF0000"/>
+                </a:solidFill>
+              </a:rPr>
+              <a:t>heroes</a:t>
+            </a:r>
+            <a:r>
+              <a:rPr lang="pl-PL" sz="2800" dirty="0">
+                <a:solidFill>
+                  <a:srgbClr val="FF0000"/>
+                </a:solidFill>
+              </a:rPr>
+              <a:t>-list&gt;&lt;/</a:t>
+            </a:r>
+            <a:r>
+              <a:rPr lang="pl-PL" sz="2800" dirty="0" err="1">
+                <a:solidFill>
+                  <a:srgbClr val="FF0000"/>
+                </a:solidFill>
+              </a:rPr>
+              <a:t>app</a:t>
+            </a:r>
+            <a:r>
+              <a:rPr lang="pl-PL" sz="2800" dirty="0">
+                <a:solidFill>
+                  <a:srgbClr val="FF0000"/>
+                </a:solidFill>
+              </a:rPr>
+              <a:t>-</a:t>
+            </a:r>
+            <a:r>
+              <a:rPr lang="pl-PL" sz="2800" dirty="0" err="1">
+                <a:solidFill>
+                  <a:srgbClr val="FF0000"/>
+                </a:solidFill>
+              </a:rPr>
+              <a:t>heroes</a:t>
+            </a:r>
+            <a:r>
+              <a:rPr lang="pl-PL" sz="2800" dirty="0">
+                <a:solidFill>
+                  <a:srgbClr val="FF0000"/>
+                </a:solidFill>
+              </a:rPr>
+              <a:t>-list&gt;</a:t>
             </a:r>
           </a:p>
           <a:p>
@@ -35672,7 +35825,7 @@
                   <a:srgbClr val="FFC000"/>
                 </a:solidFill>
               </a:rPr>
-              <a:t>'Nasz magazyn'</a:t>
+              <a:t>'Lista herosów'</a:t>
             </a:r>
             <a:r>
               <a:rPr lang="pl-PL" dirty="0"/>
@@ -36836,7 +36989,39 @@
                   <a:srgbClr val="FFC000"/>
                 </a:solidFill>
               </a:rPr>
-              <a:t>'Nasz magazyn'</a:t>
+              <a:t>'</a:t>
+            </a:r>
+            <a:r>
+              <a:rPr lang="pl-PL" dirty="0" err="1">
+                <a:solidFill>
+                  <a:srgbClr val="FFC000"/>
+                </a:solidFill>
+              </a:rPr>
+              <a:t>Heroes</a:t>
+            </a:r>
+            <a:r>
+              <a:rPr lang="pl-PL" dirty="0">
+                <a:solidFill>
+                  <a:srgbClr val="FFC000"/>
+                </a:solidFill>
+              </a:rPr>
+              <a:t> </a:t>
+            </a:r>
+            <a:r>
+              <a:rPr lang="pl-PL" dirty="0" err="1">
+                <a:solidFill>
+                  <a:srgbClr val="FFC000"/>
+                </a:solidFill>
+              </a:rPr>
+              <a:t>Academy</a:t>
+            </a:r>
+            <a:r>
+              <a:rPr lang="pl-PL" dirty="0">
+                <a:solidFill>
+                  <a:srgbClr val="FFC000"/>
+                </a:solidFill>
+              </a:rPr>
+              <a:t>'</a:t>
             </a:r>
             <a:r>
               <a:rPr lang="pl-PL" dirty="0"/>
@@ -38188,7 +38373,71 @@
                   <a:srgbClr val="FF0000"/>
                 </a:solidFill>
               </a:rPr>
-              <a:t>&lt;app-products&gt;&lt;/app-products&gt;</a:t>
+              <a:t>&lt;</a:t>
+            </a:r>
+            <a:r>
+              <a:rPr lang="pl-PL" sz="3600" dirty="0" err="1">
+                <a:solidFill>
+                  <a:srgbClr val="FF0000"/>
+                </a:solidFill>
+              </a:rPr>
+              <a:t>app</a:t>
+            </a:r>
+            <a:r>
+              <a:rPr lang="pl-PL" sz="3600" dirty="0">
+                <a:solidFill>
+                  <a:srgbClr val="FF0000"/>
+                </a:solidFill>
+              </a:rPr>
+              <a:t>-</a:t>
+            </a:r>
+            <a:r>
+              <a:rPr lang="pl-PL" sz="3600" dirty="0" err="1">
+                <a:solidFill>
+                  <a:srgbClr val="FF0000"/>
+                </a:solidFill>
+              </a:rPr>
+              <a:t>heroes</a:t>
+            </a:r>
+            <a:r>
+              <a:rPr lang="pl-PL" sz="3600" dirty="0">
+                <a:solidFill>
+                  <a:srgbClr val="FF0000"/>
+                </a:solidFill>
+              </a:rPr>
+              <a:t>-list&gt;&lt;/</a:t>
+            </a:r>
+            <a:r>
+              <a:rPr lang="pl-PL" sz="3600" dirty="0" err="1">
+                <a:solidFill>
+                  <a:srgbClr val="FF0000"/>
+                </a:solidFill>
+              </a:rPr>
+              <a:t>app</a:t>
+            </a:r>
+            <a:r>
+              <a:rPr lang="pl-PL" sz="3600" dirty="0">
+                <a:solidFill>
+                  <a:srgbClr val="FF0000"/>
+                </a:solidFill>
+              </a:rPr>
+              <a:t>-</a:t>
+            </a:r>
+            <a:r>
+              <a:rPr lang="pl-PL" sz="3600" dirty="0" err="1">
+                <a:solidFill>
+                  <a:srgbClr val="FF0000"/>
+                </a:solidFill>
+              </a:rPr>
+              <a:t>heroes</a:t>
+            </a:r>
+            <a:r>
+              <a:rPr lang="pl-PL" sz="3600" dirty="0">
+                <a:solidFill>
+                  <a:srgbClr val="FF0000"/>
+                </a:solidFill>
+              </a:rPr>
+              <a:t>-list&gt;</a:t>
             </a:r>
           </a:p>
           <a:p>
@@ -39974,7 +40223,21 @@
             </a:r>
             <a:r>
               <a:rPr lang="en-US" dirty="0"/>
-              <a:t>="true"&gt; </a:t>
+              <a:t>="</a:t>
+            </a:r>
+            <a:r>
+              <a:rPr lang="en-US" dirty="0">
+                <a:solidFill>
+                  <a:schemeClr val="accent1">
+                    <a:lumMod val="75000"/>
+                  </a:schemeClr>
+                </a:solidFill>
+              </a:rPr>
+              <a:t>true</a:t>
+            </a:r>
+            <a:r>
+              <a:rPr lang="en-US" dirty="0"/>
+              <a:t>"&gt; </a:t>
             </a:r>
             <a:endParaRPr lang="pl-PL" dirty="0"/>
           </a:p>
@@ -40034,7 +40297,21 @@
             </a:r>
             <a:r>
               <a:rPr lang="en-US" dirty="0"/>
-              <a:t>="false"&gt; </a:t>
+              <a:t>="</a:t>
+            </a:r>
+            <a:r>
+              <a:rPr lang="en-US" dirty="0">
+                <a:solidFill>
+                  <a:schemeClr val="accent1">
+                    <a:lumMod val="75000"/>
+                  </a:schemeClr>
+                </a:solidFill>
+              </a:rPr>
+              <a:t>false</a:t>
+            </a:r>
+            <a:r>
+              <a:rPr lang="en-US" dirty="0"/>
+              <a:t>"&gt; </a:t>
             </a:r>
             <a:endParaRPr lang="pl-PL" dirty="0"/>
           </a:p>
@@ -40051,12 +40328,8 @@
               <a:t>. </a:t>
             </a:r>
             <a:r>
-              <a:rPr lang="pl-PL"/>
-              <a:t>Paragraf nie jest </a:t>
-            </a:r>
-            <a:r>
               <a:rPr lang="pl-PL" dirty="0"/>
-              <a:t>w</a:t>
+              <a:t>Paragraf nie jest w</a:t>
             </a:r>
             <a:r>
               <a:rPr lang="en-US" dirty="0"/>
@@ -42376,6 +42649,197 @@
 </p:sld>
 </file>
 
+<file path=ppt/slides/slide31.xml><?xml version="1.0" encoding="utf-8"?>
+<p:sld xmlns:a="http://schemas.openxmlformats.org/drawingml/2006/main" xmlns:r="http://schemas.openxmlformats.org/officeDocument/2006/relationships" xmlns:p="http://schemas.openxmlformats.org/presentationml/2006/main">
+  <p:cSld>
+    <p:spTree>
+      <p:nvGrpSpPr>
+        <p:cNvPr id="1" name=""/>
+        <p:cNvGrpSpPr/>
+        <p:nvPr/>
+      </p:nvGrpSpPr>
+      <p:grpSpPr>
+        <a:xfrm>
+          <a:off x="0" y="0"/>
+          <a:ext cx="0" cy="0"/>
+          <a:chOff x="0" y="0"/>
+          <a:chExt cx="0" cy="0"/>
+        </a:xfrm>
+      </p:grpSpPr>
+      <p:sp>
+        <p:nvSpPr>
+          <p:cNvPr id="2" name="Title 1">
+            <a:extLst>
+              <a:ext uri="{FF2B5EF4-FFF2-40B4-BE49-F238E27FC236}">
+                <a16:creationId xmlns:a16="http://schemas.microsoft.com/office/drawing/2014/main" id="{EB6D72FC-0D67-4AB5-9EB3-3A824A5D728A}"/>
+              </a:ext>
+            </a:extLst>
+          </p:cNvPr>
+          <p:cNvSpPr>
+            <a:spLocks noGrp="1"/>
+          </p:cNvSpPr>
+          <p:nvPr>
+            <p:ph type="title"/>
+          </p:nvPr>
+        </p:nvSpPr>
+        <p:spPr/>
+        <p:txBody>
+          <a:bodyPr/>
+          <a:lstStyle/>
+          <a:p>
+            <a:r>
+              <a:rPr lang="pl-PL" dirty="0"/>
+              <a:t>W następnym odcinku:</a:t>
+            </a:r>
+          </a:p>
+        </p:txBody>
+      </p:sp>
+      <p:sp>
+        <p:nvSpPr>
+          <p:cNvPr id="3" name="Content Placeholder 2">
+            <a:extLst>
+              <a:ext uri="{FF2B5EF4-FFF2-40B4-BE49-F238E27FC236}">
+                <a16:creationId xmlns:a16="http://schemas.microsoft.com/office/drawing/2014/main" id="{5222502E-1474-45F3-83D4-635C33DE8FBB}"/>
+              </a:ext>
+            </a:extLst>
+          </p:cNvPr>
+          <p:cNvSpPr>
+            <a:spLocks noGrp="1"/>
+          </p:cNvSpPr>
+          <p:nvPr>
+            <p:ph sz="half" idx="1"/>
+          </p:nvPr>
+        </p:nvSpPr>
+        <p:spPr/>
+        <p:txBody>
+          <a:bodyPr/>
+          <a:lstStyle/>
+          <a:p>
+            <a:r>
+              <a:rPr lang="pl-PL" dirty="0"/>
+              <a:t>Data </a:t>
+            </a:r>
+            <a:r>
+              <a:rPr lang="pl-PL" dirty="0" err="1"/>
+              <a:t>binding</a:t>
+            </a:r>
+            <a:endParaRPr lang="pl-PL" dirty="0"/>
+          </a:p>
+          <a:p>
+            <a:r>
+              <a:rPr lang="pl-PL" dirty="0" err="1"/>
+              <a:t>Pipes</a:t>
+            </a:r>
+            <a:endParaRPr lang="pl-PL" dirty="0"/>
+          </a:p>
+          <a:p>
+            <a:r>
+              <a:rPr lang="pl-PL" dirty="0"/>
+              <a:t>Silne typowanie (tworzenie interfejsu)</a:t>
+            </a:r>
+          </a:p>
+          <a:p>
+            <a:r>
+              <a:rPr lang="pl-PL" dirty="0" err="1"/>
+              <a:t>Lifecycle</a:t>
+            </a:r>
+            <a:r>
+              <a:rPr lang="pl-PL" dirty="0"/>
+              <a:t> </a:t>
+            </a:r>
+            <a:r>
+              <a:rPr lang="pl-PL" dirty="0" err="1"/>
+              <a:t>hooks</a:t>
+            </a:r>
+            <a:endParaRPr lang="pl-PL" dirty="0"/>
+          </a:p>
+          <a:p>
+            <a:r>
+              <a:rPr lang="pl-PL"/>
+              <a:t>Tworzenie </a:t>
+            </a:r>
+            <a:r>
+              <a:rPr lang="pl-PL" dirty="0"/>
+              <a:t>serwisu i </a:t>
+            </a:r>
+            <a:r>
+              <a:rPr lang="pl-PL" dirty="0" err="1"/>
+              <a:t>dependency</a:t>
+            </a:r>
+            <a:r>
+              <a:rPr lang="pl-PL" dirty="0"/>
+              <a:t> </a:t>
+            </a:r>
+            <a:r>
+              <a:rPr lang="pl-PL" dirty="0" err="1"/>
+              <a:t>injection</a:t>
+            </a:r>
+            <a:endParaRPr lang="pl-PL" dirty="0"/>
+          </a:p>
+        </p:txBody>
+      </p:sp>
+      <p:pic>
+        <p:nvPicPr>
+          <p:cNvPr id="1026" name="Picture 2" descr="Chill Til The Next Episode: A 6x9 Inch Matte Softcover Notebook Journal With  120 Blank Lined Pages And A Funny Cover Slogan: Journals, GetThread:  9781726686136: Amazon.com: Books">
+            <a:extLst>
+              <a:ext uri="{FF2B5EF4-FFF2-40B4-BE49-F238E27FC236}">
+                <a16:creationId xmlns:a16="http://schemas.microsoft.com/office/drawing/2014/main" id="{BC839964-CBE6-46CC-B931-A658992F7AEB}"/>
+              </a:ext>
+            </a:extLst>
+          </p:cNvPr>
+          <p:cNvPicPr>
+            <a:picLocks noGrp="1" noChangeAspect="1" noChangeArrowheads="1"/>
+          </p:cNvPicPr>
+          <p:nvPr>
+            <p:ph sz="half" idx="2"/>
+          </p:nvPr>
+        </p:nvPicPr>
+        <p:blipFill>
+          <a:blip r:embed="rId3">
+            <a:extLst>
+              <a:ext uri="{28A0092B-C50C-407E-A947-70E740481C1C}">
+                <a14:useLocalDpi xmlns:a14="http://schemas.microsoft.com/office/drawing/2010/main" val="0"/>
+              </a:ext>
+            </a:extLst>
+          </a:blip>
+          <a:srcRect/>
+          <a:stretch>
+            <a:fillRect/>
+          </a:stretch>
+        </p:blipFill>
+        <p:spPr bwMode="auto">
+          <a:xfrm>
+            <a:off x="7312021" y="1825625"/>
+            <a:ext cx="2901958" cy="4351338"/>
+          </a:xfrm>
+          <a:prstGeom prst="rect">
+            <a:avLst/>
+          </a:prstGeom>
+          <a:noFill/>
+          <a:extLst>
+            <a:ext uri="{909E8E84-426E-40DD-AFC4-6F175D3DCCD1}">
+              <a14:hiddenFill xmlns:a14="http://schemas.microsoft.com/office/drawing/2010/main">
+                <a:solidFill>
+                  <a:srgbClr val="FFFFFF"/>
+                </a:solidFill>
+              </a14:hiddenFill>
+            </a:ext>
+          </a:extLst>
+        </p:spPr>
+      </p:pic>
+    </p:spTree>
+    <p:extLst>
+      <p:ext uri="{BB962C8B-B14F-4D97-AF65-F5344CB8AC3E}">
+        <p14:creationId xmlns:p14="http://schemas.microsoft.com/office/powerpoint/2010/main" val="4066508785"/>
+      </p:ext>
+    </p:extLst>
+  </p:cSld>
+  <p:clrMapOvr>
+    <a:masterClrMapping/>
+  </p:clrMapOvr>
+</p:sld>
+</file>
+
 <file path=ppt/slides/slide4.xml><?xml version="1.0" encoding="utf-8"?>
 <p:sld xmlns:a="http://schemas.openxmlformats.org/drawingml/2006/main" xmlns:r="http://schemas.openxmlformats.org/officeDocument/2006/relationships" xmlns:p="http://schemas.openxmlformats.org/presentationml/2006/main">
   <p:cSld>
@@ -42539,6 +43003,281 @@
   <p:clrMapOvr>
     <a:masterClrMapping/>
   </p:clrMapOvr>
+  <p:timing>
+    <p:tnLst>
+      <p:par>
+        <p:cTn id="1" dur="indefinite" restart="never" nodeType="tmRoot">
+          <p:childTnLst>
+            <p:seq concurrent="1" nextAc="seek">
+              <p:cTn id="2" dur="indefinite" nodeType="mainSeq">
+                <p:childTnLst>
+                  <p:par>
+                    <p:cTn id="3" fill="hold">
+                      <p:stCondLst>
+                        <p:cond delay="indefinite"/>
+                      </p:stCondLst>
+                      <p:childTnLst>
+                        <p:par>
+                          <p:cTn id="4" fill="hold">
+                            <p:stCondLst>
+                              <p:cond delay="0"/>
+                            </p:stCondLst>
+                            <p:childTnLst>
+                              <p:par>
+                                <p:cTn id="5" presetID="1" presetClass="entr" presetSubtype="0" fill="hold" nodeType="clickEffect">
+                                  <p:stCondLst>
+                                    <p:cond delay="0"/>
+                                  </p:stCondLst>
+                                  <p:childTnLst>
+                                    <p:set>
+                                      <p:cBhvr>
+                                        <p:cTn id="6" dur="1" fill="hold">
+                                          <p:stCondLst>
+                                            <p:cond delay="0"/>
+                                          </p:stCondLst>
+                                        </p:cTn>
+                                        <p:tgtEl>
+                                          <p:spTgt spid="4">
+                                            <p:txEl>
+                                              <p:pRg st="0" end="0"/>
+                                            </p:txEl>
+                                          </p:spTgt>
+                                        </p:tgtEl>
+                                        <p:attrNameLst>
+                                          <p:attrName>style.visibility</p:attrName>
+                                        </p:attrNameLst>
+                                      </p:cBhvr>
+                                      <p:to>
+                                        <p:strVal val="visible"/>
+                                      </p:to>
+                                    </p:set>
+                                  </p:childTnLst>
+                                </p:cTn>
+                              </p:par>
+                            </p:childTnLst>
+                          </p:cTn>
+                        </p:par>
+                      </p:childTnLst>
+                    </p:cTn>
+                  </p:par>
+                  <p:par>
+                    <p:cTn id="7" fill="hold">
+                      <p:stCondLst>
+                        <p:cond delay="indefinite"/>
+                      </p:stCondLst>
+                      <p:childTnLst>
+                        <p:par>
+                          <p:cTn id="8" fill="hold">
+                            <p:stCondLst>
+                              <p:cond delay="0"/>
+                            </p:stCondLst>
+                            <p:childTnLst>
+                              <p:par>
+                                <p:cTn id="9" presetID="1" presetClass="entr" presetSubtype="0" fill="hold" nodeType="clickEffect">
+                                  <p:stCondLst>
+                                    <p:cond delay="0"/>
+                                  </p:stCondLst>
+                                  <p:childTnLst>
+                                    <p:set>
+                                      <p:cBhvr>
+                                        <p:cTn id="10" dur="1" fill="hold">
+                                          <p:stCondLst>
+                                            <p:cond delay="0"/>
+                                          </p:stCondLst>
+                                        </p:cTn>
+                                        <p:tgtEl>
+                                          <p:spTgt spid="4">
+                                            <p:txEl>
+                                              <p:pRg st="1" end="1"/>
+                                            </p:txEl>
+                                          </p:spTgt>
+                                        </p:tgtEl>
+                                        <p:attrNameLst>
+                                          <p:attrName>style.visibility</p:attrName>
+                                        </p:attrNameLst>
+                                      </p:cBhvr>
+                                      <p:to>
+                                        <p:strVal val="visible"/>
+                                      </p:to>
+                                    </p:set>
+                                  </p:childTnLst>
+                                </p:cTn>
+                              </p:par>
+                            </p:childTnLst>
+                          </p:cTn>
+                        </p:par>
+                      </p:childTnLst>
+                    </p:cTn>
+                  </p:par>
+                  <p:par>
+                    <p:cTn id="11" fill="hold">
+                      <p:stCondLst>
+                        <p:cond delay="indefinite"/>
+                      </p:stCondLst>
+                      <p:childTnLst>
+                        <p:par>
+                          <p:cTn id="12" fill="hold">
+                            <p:stCondLst>
+                              <p:cond delay="0"/>
+                            </p:stCondLst>
+                            <p:childTnLst>
+                              <p:par>
+                                <p:cTn id="13" presetID="1" presetClass="entr" presetSubtype="0" fill="hold" nodeType="clickEffect">
+                                  <p:stCondLst>
+                                    <p:cond delay="0"/>
+                                  </p:stCondLst>
+                                  <p:childTnLst>
+                                    <p:set>
+                                      <p:cBhvr>
+                                        <p:cTn id="14" dur="1" fill="hold">
+                                          <p:stCondLst>
+                                            <p:cond delay="0"/>
+                                          </p:stCondLst>
+                                        </p:cTn>
+                                        <p:tgtEl>
+                                          <p:spTgt spid="4">
+                                            <p:txEl>
+                                              <p:pRg st="2" end="2"/>
+                                            </p:txEl>
+                                          </p:spTgt>
+                                        </p:tgtEl>
+                                        <p:attrNameLst>
+                                          <p:attrName>style.visibility</p:attrName>
+                                        </p:attrNameLst>
+                                      </p:cBhvr>
+                                      <p:to>
+                                        <p:strVal val="visible"/>
+                                      </p:to>
+                                    </p:set>
+                                  </p:childTnLst>
+                                </p:cTn>
+                              </p:par>
+                            </p:childTnLst>
+                          </p:cTn>
+                        </p:par>
+                      </p:childTnLst>
+                    </p:cTn>
+                  </p:par>
+                  <p:par>
+                    <p:cTn id="15" fill="hold">
+                      <p:stCondLst>
+                        <p:cond delay="indefinite"/>
+                      </p:stCondLst>
+                      <p:childTnLst>
+                        <p:par>
+                          <p:cTn id="16" fill="hold">
+                            <p:stCondLst>
+                              <p:cond delay="0"/>
+                            </p:stCondLst>
+                            <p:childTnLst>
+                              <p:par>
+                                <p:cTn id="17" presetID="1" presetClass="entr" presetSubtype="0" fill="hold" nodeType="clickEffect">
+                                  <p:stCondLst>
+                                    <p:cond delay="0"/>
+                                  </p:stCondLst>
+                                  <p:childTnLst>
+                                    <p:set>
+                                      <p:cBhvr>
+                                        <p:cTn id="18" dur="1" fill="hold">
+                                          <p:stCondLst>
+                                            <p:cond delay="0"/>
+                                          </p:stCondLst>
+                                        </p:cTn>
+                                        <p:tgtEl>
+                                          <p:spTgt spid="4">
+                                            <p:txEl>
+                                              <p:pRg st="3" end="3"/>
+                                            </p:txEl>
+                                          </p:spTgt>
+                                        </p:tgtEl>
+                                        <p:attrNameLst>
+                                          <p:attrName>style.visibility</p:attrName>
+                                        </p:attrNameLst>
+                                      </p:cBhvr>
+                                      <p:to>
+                                        <p:strVal val="visible"/>
+                                      </p:to>
+                                    </p:set>
+                                  </p:childTnLst>
+                                </p:cTn>
+                              </p:par>
+                            </p:childTnLst>
+                          </p:cTn>
+                        </p:par>
+                      </p:childTnLst>
+                    </p:cTn>
+                  </p:par>
+                  <p:par>
+                    <p:cTn id="19" fill="hold">
+                      <p:stCondLst>
+                        <p:cond delay="indefinite"/>
+                      </p:stCondLst>
+                      <p:childTnLst>
+                        <p:par>
+                          <p:cTn id="20" fill="hold">
+                            <p:stCondLst>
+                              <p:cond delay="0"/>
+                            </p:stCondLst>
+                            <p:childTnLst>
+                              <p:par>
+                                <p:cTn id="21" presetID="1" presetClass="entr" presetSubtype="0" fill="hold" nodeType="clickEffect">
+                                  <p:stCondLst>
+                                    <p:cond delay="0"/>
+                                  </p:stCondLst>
+                                  <p:childTnLst>
+                                    <p:set>
+                                      <p:cBhvr>
+                                        <p:cTn id="22" dur="1" fill="hold">
+                                          <p:stCondLst>
+                                            <p:cond delay="0"/>
+                                          </p:stCondLst>
+                                        </p:cTn>
+                                        <p:tgtEl>
+                                          <p:spTgt spid="4">
+                                            <p:txEl>
+                                              <p:pRg st="4" end="4"/>
+                                            </p:txEl>
+                                          </p:spTgt>
+                                        </p:tgtEl>
+                                        <p:attrNameLst>
+                                          <p:attrName>style.visibility</p:attrName>
+                                        </p:attrNameLst>
+                                      </p:cBhvr>
+                                      <p:to>
+                                        <p:strVal val="visible"/>
+                                      </p:to>
+                                    </p:set>
+                                  </p:childTnLst>
+                                </p:cTn>
+                              </p:par>
+                            </p:childTnLst>
+                          </p:cTn>
+                        </p:par>
+                      </p:childTnLst>
+                    </p:cTn>
+                  </p:par>
+                </p:childTnLst>
+              </p:cTn>
+              <p:prevCondLst>
+                <p:cond evt="onPrev" delay="0">
+                  <p:tgtEl>
+                    <p:sldTgt/>
+                  </p:tgtEl>
+                </p:cond>
+              </p:prevCondLst>
+              <p:nextCondLst>
+                <p:cond evt="onNext" delay="0">
+                  <p:tgtEl>
+                    <p:sldTgt/>
+                  </p:tgtEl>
+                </p:cond>
+              </p:nextCondLst>
+            </p:seq>
+          </p:childTnLst>
+        </p:cTn>
+      </p:par>
+    </p:tnLst>
+  </p:timing>
 </p:sld>
 </file>
 
@@ -42664,6 +43403,86 @@
   <p:clrMapOvr>
     <a:masterClrMapping/>
   </p:clrMapOvr>
+  <p:timing>
+    <p:tnLst>
+      <p:par>
+        <p:cTn id="1" dur="indefinite" restart="never" nodeType="tmRoot">
+          <p:childTnLst>
+            <p:seq concurrent="1" nextAc="seek">
+              <p:cTn id="2" dur="indefinite" nodeType="mainSeq">
+                <p:childTnLst>
+                  <p:par>
+                    <p:cTn id="3" fill="hold">
+                      <p:stCondLst>
+                        <p:cond delay="indefinite"/>
+                      </p:stCondLst>
+                      <p:childTnLst>
+                        <p:par>
+                          <p:cTn id="4" fill="hold">
+                            <p:stCondLst>
+                              <p:cond delay="0"/>
+                            </p:stCondLst>
+                            <p:childTnLst>
+                              <p:par>
+                                <p:cTn id="5" presetID="1" presetClass="entr" presetSubtype="0" fill="hold" grpId="0" nodeType="clickEffect">
+                                  <p:stCondLst>
+                                    <p:cond delay="0"/>
+                                  </p:stCondLst>
+                                  <p:childTnLst>
+                                    <p:set>
+                                      <p:cBhvr>
+                                        <p:cTn id="6" dur="1" fill="hold">
+                                          <p:stCondLst>
+                                            <p:cond delay="0"/>
+                                          </p:stCondLst>
+                                        </p:cTn>
+                                        <p:tgtEl>
+                                          <p:spTgt spid="4"/>
+                                        </p:tgtEl>
+                                        <p:attrNameLst>
+                                          <p:attrName>style.visibility</p:attrName>
+                                        </p:attrNameLst>
+                                      </p:cBhvr>
+                                      <p:to>
+                                        <p:strVal val="visible"/>
+                                      </p:to>
+                                    </p:set>
+                                  </p:childTnLst>
+                                </p:cTn>
+                              </p:par>
+                            </p:childTnLst>
+                          </p:cTn>
+                        </p:par>
+                      </p:childTnLst>
+                    </p:cTn>
+                  </p:par>
+                </p:childTnLst>
+              </p:cTn>
+              <p:prevCondLst>
+                <p:cond evt="onPrev" delay="0">
+                  <p:tgtEl>
+                    <p:sldTgt/>
+                  </p:tgtEl>
+                </p:cond>
+              </p:prevCondLst>
+              <p:nextCondLst>
+                <p:cond evt="onNext" delay="0">
+                  <p:tgtEl>
+                    <p:sldTgt/>
+                  </p:tgtEl>
+                </p:cond>
+              </p:nextCondLst>
+            </p:seq>
+          </p:childTnLst>
+        </p:cTn>
+      </p:par>
+    </p:tnLst>
+    <p:bldLst>
+      <p:bldGraphic spid="4" grpId="0">
+        <p:bldAsOne/>
+      </p:bldGraphic>
+    </p:bldLst>
+  </p:timing>
 </p:sld>
 </file>
 

</xml_diff>

<commit_message>
Upgrade slide was moved to presentation 1
</commit_message>
<xml_diff>
--- a/1/presentation/Angular 1.pptx
+++ b/1/presentation/Angular 1.pptx
@@ -5,7 +5,7 @@
     <p:sldMasterId id="2147483648" r:id="rId1"/>
   </p:sldMasterIdLst>
   <p:notesMasterIdLst>
-    <p:notesMasterId r:id="rId33"/>
+    <p:notesMasterId r:id="rId34"/>
   </p:notesMasterIdLst>
   <p:sldIdLst>
     <p:sldId id="256" r:id="rId2"/>
@@ -19,26 +19,27 @@
     <p:sldId id="266" r:id="rId10"/>
     <p:sldId id="267" r:id="rId11"/>
     <p:sldId id="268" r:id="rId12"/>
-    <p:sldId id="265" r:id="rId13"/>
-    <p:sldId id="264" r:id="rId14"/>
-    <p:sldId id="269" r:id="rId15"/>
-    <p:sldId id="270" r:id="rId16"/>
-    <p:sldId id="271" r:id="rId17"/>
-    <p:sldId id="272" r:id="rId18"/>
-    <p:sldId id="277" r:id="rId19"/>
-    <p:sldId id="273" r:id="rId20"/>
-    <p:sldId id="286" r:id="rId21"/>
-    <p:sldId id="278" r:id="rId22"/>
-    <p:sldId id="314" r:id="rId23"/>
-    <p:sldId id="307" r:id="rId24"/>
-    <p:sldId id="315" r:id="rId25"/>
-    <p:sldId id="309" r:id="rId26"/>
-    <p:sldId id="310" r:id="rId27"/>
-    <p:sldId id="311" r:id="rId28"/>
-    <p:sldId id="316" r:id="rId29"/>
-    <p:sldId id="287" r:id="rId30"/>
-    <p:sldId id="288" r:id="rId31"/>
-    <p:sldId id="317" r:id="rId32"/>
+    <p:sldId id="342" r:id="rId13"/>
+    <p:sldId id="265" r:id="rId14"/>
+    <p:sldId id="264" r:id="rId15"/>
+    <p:sldId id="269" r:id="rId16"/>
+    <p:sldId id="270" r:id="rId17"/>
+    <p:sldId id="271" r:id="rId18"/>
+    <p:sldId id="272" r:id="rId19"/>
+    <p:sldId id="277" r:id="rId20"/>
+    <p:sldId id="273" r:id="rId21"/>
+    <p:sldId id="286" r:id="rId22"/>
+    <p:sldId id="278" r:id="rId23"/>
+    <p:sldId id="314" r:id="rId24"/>
+    <p:sldId id="307" r:id="rId25"/>
+    <p:sldId id="315" r:id="rId26"/>
+    <p:sldId id="309" r:id="rId27"/>
+    <p:sldId id="310" r:id="rId28"/>
+    <p:sldId id="311" r:id="rId29"/>
+    <p:sldId id="316" r:id="rId30"/>
+    <p:sldId id="287" r:id="rId31"/>
+    <p:sldId id="288" r:id="rId32"/>
+    <p:sldId id="317" r:id="rId33"/>
   </p:sldIdLst>
   <p:sldSz cx="12192000" cy="6858000"/>
   <p:notesSz cx="6858000" cy="9144000"/>
@@ -17806,6 +17807,93 @@
           <a:bodyPr/>
           <a:lstStyle/>
           <a:p>
+            <a:r>
+              <a:rPr lang="pl-PL" dirty="0"/>
+              <a:t>Szczegółowe omówienie klasy</a:t>
+            </a:r>
+          </a:p>
+        </p:txBody>
+      </p:sp>
+      <p:sp>
+        <p:nvSpPr>
+          <p:cNvPr id="4" name="Slide Number Placeholder 3"/>
+          <p:cNvSpPr>
+            <a:spLocks noGrp="1"/>
+          </p:cNvSpPr>
+          <p:nvPr>
+            <p:ph type="sldNum" sz="quarter" idx="5"/>
+          </p:nvPr>
+        </p:nvSpPr>
+        <p:spPr/>
+        <p:txBody>
+          <a:bodyPr/>
+          <a:lstStyle/>
+          <a:p>
+            <a:fld id="{F89D2610-1426-4EFD-83D2-2399D4353A5D}" type="slidenum">
+              <a:rPr lang="pl-PL" smtClean="0"/>
+              <a:t>16</a:t>
+            </a:fld>
+            <a:endParaRPr lang="pl-PL"/>
+          </a:p>
+        </p:txBody>
+      </p:sp>
+    </p:spTree>
+    <p:extLst>
+      <p:ext uri="{BB962C8B-B14F-4D97-AF65-F5344CB8AC3E}">
+        <p14:creationId xmlns:p14="http://schemas.microsoft.com/office/powerpoint/2010/main" val="3705693752"/>
+      </p:ext>
+    </p:extLst>
+  </p:cSld>
+  <p:clrMapOvr>
+    <a:masterClrMapping/>
+  </p:clrMapOvr>
+</p:notes>
+</file>
+
+<file path=ppt/notesSlides/notesSlide11.xml><?xml version="1.0" encoding="utf-8"?>
+<p:notes xmlns:a="http://schemas.openxmlformats.org/drawingml/2006/main" xmlns:r="http://schemas.openxmlformats.org/officeDocument/2006/relationships" xmlns:p="http://schemas.openxmlformats.org/presentationml/2006/main">
+  <p:cSld>
+    <p:spTree>
+      <p:nvGrpSpPr>
+        <p:cNvPr id="1" name=""/>
+        <p:cNvGrpSpPr/>
+        <p:nvPr/>
+      </p:nvGrpSpPr>
+      <p:grpSpPr>
+        <a:xfrm>
+          <a:off x="0" y="0"/>
+          <a:ext cx="0" cy="0"/>
+          <a:chOff x="0" y="0"/>
+          <a:chExt cx="0" cy="0"/>
+        </a:xfrm>
+      </p:grpSpPr>
+      <p:sp>
+        <p:nvSpPr>
+          <p:cNvPr id="2" name="Slide Image Placeholder 1"/>
+          <p:cNvSpPr>
+            <a:spLocks noGrp="1" noRot="1" noChangeAspect="1"/>
+          </p:cNvSpPr>
+          <p:nvPr>
+            <p:ph type="sldImg"/>
+          </p:nvPr>
+        </p:nvSpPr>
+        <p:spPr/>
+      </p:sp>
+      <p:sp>
+        <p:nvSpPr>
+          <p:cNvPr id="3" name="Notes Placeholder 2"/>
+          <p:cNvSpPr>
+            <a:spLocks noGrp="1"/>
+          </p:cNvSpPr>
+          <p:nvPr>
+            <p:ph type="body" idx="1"/>
+          </p:nvPr>
+        </p:nvSpPr>
+        <p:spPr/>
+        <p:txBody>
+          <a:bodyPr/>
+          <a:lstStyle/>
+          <a:p>
             <a:endParaRPr lang="pl-PL" dirty="0"/>
           </a:p>
         </p:txBody>
@@ -17827,7 +17915,7 @@
           <a:p>
             <a:fld id="{F89D2610-1426-4EFD-83D2-2399D4353A5D}" type="slidenum">
               <a:rPr lang="pl-PL" smtClean="0"/>
-              <a:t>17</a:t>
+              <a:t>18</a:t>
             </a:fld>
             <a:endParaRPr lang="pl-PL"/>
           </a:p>
@@ -17846,7 +17934,7 @@
 </p:notes>
 </file>
 
-<file path=ppt/notesSlides/notesSlide11.xml><?xml version="1.0" encoding="utf-8"?>
+<file path=ppt/notesSlides/notesSlide12.xml><?xml version="1.0" encoding="utf-8"?>
 <p:notes xmlns:a="http://schemas.openxmlformats.org/drawingml/2006/main" xmlns:r="http://schemas.openxmlformats.org/officeDocument/2006/relationships" xmlns:p="http://schemas.openxmlformats.org/presentationml/2006/main">
   <p:cSld>
     <p:spTree>
@@ -17920,7 +18008,7 @@
           <a:p>
             <a:fld id="{F89D2610-1426-4EFD-83D2-2399D4353A5D}" type="slidenum">
               <a:rPr lang="pl-PL" smtClean="0"/>
-              <a:t>18</a:t>
+              <a:t>19</a:t>
             </a:fld>
             <a:endParaRPr lang="pl-PL"/>
           </a:p>
@@ -17930,102 +18018,6 @@
     <p:extLst>
       <p:ext uri="{BB962C8B-B14F-4D97-AF65-F5344CB8AC3E}">
         <p14:creationId xmlns:p14="http://schemas.microsoft.com/office/powerpoint/2010/main" val="1764932353"/>
-      </p:ext>
-    </p:extLst>
-  </p:cSld>
-  <p:clrMapOvr>
-    <a:masterClrMapping/>
-  </p:clrMapOvr>
-</p:notes>
-</file>
-
-<file path=ppt/notesSlides/notesSlide12.xml><?xml version="1.0" encoding="utf-8"?>
-<p:notes xmlns:a="http://schemas.openxmlformats.org/drawingml/2006/main" xmlns:r="http://schemas.openxmlformats.org/officeDocument/2006/relationships" xmlns:p="http://schemas.openxmlformats.org/presentationml/2006/main">
-  <p:cSld>
-    <p:spTree>
-      <p:nvGrpSpPr>
-        <p:cNvPr id="1" name=""/>
-        <p:cNvGrpSpPr/>
-        <p:nvPr/>
-      </p:nvGrpSpPr>
-      <p:grpSpPr>
-        <a:xfrm>
-          <a:off x="0" y="0"/>
-          <a:ext cx="0" cy="0"/>
-          <a:chOff x="0" y="0"/>
-          <a:chExt cx="0" cy="0"/>
-        </a:xfrm>
-      </p:grpSpPr>
-      <p:sp>
-        <p:nvSpPr>
-          <p:cNvPr id="2" name="Slide Image Placeholder 1"/>
-          <p:cNvSpPr>
-            <a:spLocks noGrp="1" noRot="1" noChangeAspect="1"/>
-          </p:cNvSpPr>
-          <p:nvPr>
-            <p:ph type="sldImg"/>
-          </p:nvPr>
-        </p:nvSpPr>
-        <p:spPr/>
-      </p:sp>
-      <p:sp>
-        <p:nvSpPr>
-          <p:cNvPr id="3" name="Notes Placeholder 2"/>
-          <p:cNvSpPr>
-            <a:spLocks noGrp="1"/>
-          </p:cNvSpPr>
-          <p:nvPr>
-            <p:ph type="body" idx="1"/>
-          </p:nvPr>
-        </p:nvSpPr>
-        <p:spPr/>
-        <p:txBody>
-          <a:bodyPr/>
-          <a:lstStyle/>
-          <a:p>
-            <a:r>
-              <a:rPr lang="pl-PL" dirty="0" err="1"/>
-              <a:t>AppComponent</a:t>
-            </a:r>
-            <a:r>
-              <a:rPr lang="pl-PL" dirty="0"/>
-              <a:t> i Utworzenie komponentu </a:t>
-            </a:r>
-            <a:r>
-              <a:rPr lang="pl-PL" dirty="0" err="1"/>
-              <a:t>welcome</a:t>
-            </a:r>
-            <a:endParaRPr lang="pl-PL" dirty="0"/>
-          </a:p>
-        </p:txBody>
-      </p:sp>
-      <p:sp>
-        <p:nvSpPr>
-          <p:cNvPr id="4" name="Slide Number Placeholder 3"/>
-          <p:cNvSpPr>
-            <a:spLocks noGrp="1"/>
-          </p:cNvSpPr>
-          <p:nvPr>
-            <p:ph type="sldNum" sz="quarter" idx="5"/>
-          </p:nvPr>
-        </p:nvSpPr>
-        <p:spPr/>
-        <p:txBody>
-          <a:bodyPr/>
-          <a:lstStyle/>
-          <a:p>
-            <a:fld id="{F89D2610-1426-4EFD-83D2-2399D4353A5D}" type="slidenum">
-              <a:rPr lang="pl-PL" smtClean="0"/>
-              <a:t>19</a:t>
-            </a:fld>
-            <a:endParaRPr lang="pl-PL"/>
-          </a:p>
-        </p:txBody>
-      </p:sp>
-    </p:spTree>
-    <p:extLst>
-      <p:ext uri="{BB962C8B-B14F-4D97-AF65-F5344CB8AC3E}">
-        <p14:creationId xmlns:p14="http://schemas.microsoft.com/office/powerpoint/2010/main" val="2131010053"/>
       </p:ext>
     </p:extLst>
   </p:cSld>
@@ -18080,9 +18072,18 @@
           <a:lstStyle/>
           <a:p>
             <a:r>
+              <a:rPr lang="pl-PL" dirty="0" err="1"/>
+              <a:t>AppComponent</a:t>
+            </a:r>
+            <a:r>
               <a:rPr lang="pl-PL" dirty="0"/>
-              <a:t>Interpolacja</a:t>
-            </a:r>
+              <a:t> i Utworzenie komponentu </a:t>
+            </a:r>
+            <a:r>
+              <a:rPr lang="pl-PL" dirty="0" err="1"/>
+              <a:t>welcome</a:t>
+            </a:r>
+            <a:endParaRPr lang="pl-PL" dirty="0"/>
           </a:p>
         </p:txBody>
       </p:sp>
@@ -18103,7 +18104,7 @@
           <a:p>
             <a:fld id="{F89D2610-1426-4EFD-83D2-2399D4353A5D}" type="slidenum">
               <a:rPr lang="pl-PL" smtClean="0"/>
-              <a:t>23</a:t>
+              <a:t>20</a:t>
             </a:fld>
             <a:endParaRPr lang="pl-PL"/>
           </a:p>
@@ -18112,7 +18113,7 @@
     </p:spTree>
     <p:extLst>
       <p:ext uri="{BB962C8B-B14F-4D97-AF65-F5344CB8AC3E}">
-        <p14:creationId xmlns:p14="http://schemas.microsoft.com/office/powerpoint/2010/main" val="2258788334"/>
+        <p14:creationId xmlns:p14="http://schemas.microsoft.com/office/powerpoint/2010/main" val="2131010053"/>
       </p:ext>
     </p:extLst>
   </p:cSld>
@@ -18166,7 +18167,10 @@
           <a:bodyPr/>
           <a:lstStyle/>
           <a:p>
-            <a:endParaRPr lang="pl-PL" dirty="0"/>
+            <a:r>
+              <a:rPr lang="pl-PL" dirty="0"/>
+              <a:t>Interpolacja</a:t>
+            </a:r>
           </a:p>
         </p:txBody>
       </p:sp>
@@ -18187,7 +18191,7 @@
           <a:p>
             <a:fld id="{F89D2610-1426-4EFD-83D2-2399D4353A5D}" type="slidenum">
               <a:rPr lang="pl-PL" smtClean="0"/>
-              <a:t>26</a:t>
+              <a:t>24</a:t>
             </a:fld>
             <a:endParaRPr lang="pl-PL"/>
           </a:p>
@@ -18196,7 +18200,7 @@
     </p:spTree>
     <p:extLst>
       <p:ext uri="{BB962C8B-B14F-4D97-AF65-F5344CB8AC3E}">
-        <p14:creationId xmlns:p14="http://schemas.microsoft.com/office/powerpoint/2010/main" val="2716826980"/>
+        <p14:creationId xmlns:p14="http://schemas.microsoft.com/office/powerpoint/2010/main" val="2258788334"/>
       </p:ext>
     </p:extLst>
   </p:cSld>
@@ -18280,7 +18284,7 @@
     </p:spTree>
     <p:extLst>
       <p:ext uri="{BB962C8B-B14F-4D97-AF65-F5344CB8AC3E}">
-        <p14:creationId xmlns:p14="http://schemas.microsoft.com/office/powerpoint/2010/main" val="2130864748"/>
+        <p14:creationId xmlns:p14="http://schemas.microsoft.com/office/powerpoint/2010/main" val="2716826980"/>
       </p:ext>
     </p:extLst>
   </p:cSld>
@@ -18291,106 +18295,6 @@
 </file>
 
 <file path=ppt/notesSlides/notesSlide16.xml><?xml version="1.0" encoding="utf-8"?>
-<p:notes xmlns:a="http://schemas.openxmlformats.org/drawingml/2006/main" xmlns:r="http://schemas.openxmlformats.org/officeDocument/2006/relationships" xmlns:p="http://schemas.openxmlformats.org/presentationml/2006/main">
-  <p:cSld>
-    <p:spTree>
-      <p:nvGrpSpPr>
-        <p:cNvPr id="1" name=""/>
-        <p:cNvGrpSpPr/>
-        <p:nvPr/>
-      </p:nvGrpSpPr>
-      <p:grpSpPr>
-        <a:xfrm>
-          <a:off x="0" y="0"/>
-          <a:ext cx="0" cy="0"/>
-          <a:chOff x="0" y="0"/>
-          <a:chExt cx="0" cy="0"/>
-        </a:xfrm>
-      </p:grpSpPr>
-      <p:sp>
-        <p:nvSpPr>
-          <p:cNvPr id="2" name="Slide Image Placeholder 1"/>
-          <p:cNvSpPr>
-            <a:spLocks noGrp="1" noRot="1" noChangeAspect="1"/>
-          </p:cNvSpPr>
-          <p:nvPr>
-            <p:ph type="sldImg"/>
-          </p:nvPr>
-        </p:nvSpPr>
-        <p:spPr/>
-      </p:sp>
-      <p:sp>
-        <p:nvSpPr>
-          <p:cNvPr id="3" name="Notes Placeholder 2"/>
-          <p:cNvSpPr>
-            <a:spLocks noGrp="1"/>
-          </p:cNvSpPr>
-          <p:nvPr>
-            <p:ph type="body" idx="1"/>
-          </p:nvPr>
-        </p:nvSpPr>
-        <p:spPr/>
-        <p:txBody>
-          <a:bodyPr/>
-          <a:lstStyle/>
-          <a:p>
-            <a:r>
-              <a:rPr lang="pl-PL" dirty="0"/>
-              <a:t>Przykład </a:t>
-            </a:r>
-            <a:r>
-              <a:rPr lang="pl-PL" dirty="0" err="1"/>
-              <a:t>ngIf</a:t>
-            </a:r>
-            <a:r>
-              <a:rPr lang="pl-PL" dirty="0"/>
-              <a:t> i </a:t>
-            </a:r>
-            <a:r>
-              <a:rPr lang="pl-PL" dirty="0" err="1"/>
-              <a:t>ngFor</a:t>
-            </a:r>
-            <a:endParaRPr lang="pl-PL" dirty="0"/>
-          </a:p>
-        </p:txBody>
-      </p:sp>
-      <p:sp>
-        <p:nvSpPr>
-          <p:cNvPr id="4" name="Slide Number Placeholder 3"/>
-          <p:cNvSpPr>
-            <a:spLocks noGrp="1"/>
-          </p:cNvSpPr>
-          <p:nvPr>
-            <p:ph type="sldNum" sz="quarter" idx="5"/>
-          </p:nvPr>
-        </p:nvSpPr>
-        <p:spPr/>
-        <p:txBody>
-          <a:bodyPr/>
-          <a:lstStyle/>
-          <a:p>
-            <a:fld id="{F89D2610-1426-4EFD-83D2-2399D4353A5D}" type="slidenum">
-              <a:rPr lang="pl-PL" smtClean="0"/>
-              <a:t>28</a:t>
-            </a:fld>
-            <a:endParaRPr lang="pl-PL"/>
-          </a:p>
-        </p:txBody>
-      </p:sp>
-    </p:spTree>
-    <p:extLst>
-      <p:ext uri="{BB962C8B-B14F-4D97-AF65-F5344CB8AC3E}">
-        <p14:creationId xmlns:p14="http://schemas.microsoft.com/office/powerpoint/2010/main" val="1511666208"/>
-      </p:ext>
-    </p:extLst>
-  </p:cSld>
-  <p:clrMapOvr>
-    <a:masterClrMapping/>
-  </p:clrMapOvr>
-</p:notes>
-</file>
-
-<file path=ppt/notesSlides/notesSlide17.xml><?xml version="1.0" encoding="utf-8"?>
 <p:notes xmlns:a="http://schemas.openxmlformats.org/drawingml/2006/main" xmlns:r="http://schemas.openxmlformats.org/officeDocument/2006/relationships" xmlns:p="http://schemas.openxmlformats.org/presentationml/2006/main">
   <p:cSld>
     <p:spTree>
@@ -18455,7 +18359,191 @@
           <a:p>
             <a:fld id="{F89D2610-1426-4EFD-83D2-2399D4353A5D}" type="slidenum">
               <a:rPr lang="pl-PL" smtClean="0"/>
-              <a:t>31</a:t>
+              <a:t>28</a:t>
+            </a:fld>
+            <a:endParaRPr lang="pl-PL"/>
+          </a:p>
+        </p:txBody>
+      </p:sp>
+    </p:spTree>
+    <p:extLst>
+      <p:ext uri="{BB962C8B-B14F-4D97-AF65-F5344CB8AC3E}">
+        <p14:creationId xmlns:p14="http://schemas.microsoft.com/office/powerpoint/2010/main" val="2130864748"/>
+      </p:ext>
+    </p:extLst>
+  </p:cSld>
+  <p:clrMapOvr>
+    <a:masterClrMapping/>
+  </p:clrMapOvr>
+</p:notes>
+</file>
+
+<file path=ppt/notesSlides/notesSlide17.xml><?xml version="1.0" encoding="utf-8"?>
+<p:notes xmlns:a="http://schemas.openxmlformats.org/drawingml/2006/main" xmlns:r="http://schemas.openxmlformats.org/officeDocument/2006/relationships" xmlns:p="http://schemas.openxmlformats.org/presentationml/2006/main">
+  <p:cSld>
+    <p:spTree>
+      <p:nvGrpSpPr>
+        <p:cNvPr id="1" name=""/>
+        <p:cNvGrpSpPr/>
+        <p:nvPr/>
+      </p:nvGrpSpPr>
+      <p:grpSpPr>
+        <a:xfrm>
+          <a:off x="0" y="0"/>
+          <a:ext cx="0" cy="0"/>
+          <a:chOff x="0" y="0"/>
+          <a:chExt cx="0" cy="0"/>
+        </a:xfrm>
+      </p:grpSpPr>
+      <p:sp>
+        <p:nvSpPr>
+          <p:cNvPr id="2" name="Slide Image Placeholder 1"/>
+          <p:cNvSpPr>
+            <a:spLocks noGrp="1" noRot="1" noChangeAspect="1"/>
+          </p:cNvSpPr>
+          <p:nvPr>
+            <p:ph type="sldImg"/>
+          </p:nvPr>
+        </p:nvSpPr>
+        <p:spPr/>
+      </p:sp>
+      <p:sp>
+        <p:nvSpPr>
+          <p:cNvPr id="3" name="Notes Placeholder 2"/>
+          <p:cNvSpPr>
+            <a:spLocks noGrp="1"/>
+          </p:cNvSpPr>
+          <p:nvPr>
+            <p:ph type="body" idx="1"/>
+          </p:nvPr>
+        </p:nvSpPr>
+        <p:spPr/>
+        <p:txBody>
+          <a:bodyPr/>
+          <a:lstStyle/>
+          <a:p>
+            <a:r>
+              <a:rPr lang="pl-PL" dirty="0"/>
+              <a:t>Przykład </a:t>
+            </a:r>
+            <a:r>
+              <a:rPr lang="pl-PL" dirty="0" err="1"/>
+              <a:t>ngIf</a:t>
+            </a:r>
+            <a:r>
+              <a:rPr lang="pl-PL" dirty="0"/>
+              <a:t> i </a:t>
+            </a:r>
+            <a:r>
+              <a:rPr lang="pl-PL" dirty="0" err="1"/>
+              <a:t>ngFor</a:t>
+            </a:r>
+            <a:endParaRPr lang="pl-PL" dirty="0"/>
+          </a:p>
+        </p:txBody>
+      </p:sp>
+      <p:sp>
+        <p:nvSpPr>
+          <p:cNvPr id="4" name="Slide Number Placeholder 3"/>
+          <p:cNvSpPr>
+            <a:spLocks noGrp="1"/>
+          </p:cNvSpPr>
+          <p:nvPr>
+            <p:ph type="sldNum" sz="quarter" idx="5"/>
+          </p:nvPr>
+        </p:nvSpPr>
+        <p:spPr/>
+        <p:txBody>
+          <a:bodyPr/>
+          <a:lstStyle/>
+          <a:p>
+            <a:fld id="{F89D2610-1426-4EFD-83D2-2399D4353A5D}" type="slidenum">
+              <a:rPr lang="pl-PL" smtClean="0"/>
+              <a:t>29</a:t>
+            </a:fld>
+            <a:endParaRPr lang="pl-PL"/>
+          </a:p>
+        </p:txBody>
+      </p:sp>
+    </p:spTree>
+    <p:extLst>
+      <p:ext uri="{BB962C8B-B14F-4D97-AF65-F5344CB8AC3E}">
+        <p14:creationId xmlns:p14="http://schemas.microsoft.com/office/powerpoint/2010/main" val="1511666208"/>
+      </p:ext>
+    </p:extLst>
+  </p:cSld>
+  <p:clrMapOvr>
+    <a:masterClrMapping/>
+  </p:clrMapOvr>
+</p:notes>
+</file>
+
+<file path=ppt/notesSlides/notesSlide18.xml><?xml version="1.0" encoding="utf-8"?>
+<p:notes xmlns:a="http://schemas.openxmlformats.org/drawingml/2006/main" xmlns:r="http://schemas.openxmlformats.org/officeDocument/2006/relationships" xmlns:p="http://schemas.openxmlformats.org/presentationml/2006/main">
+  <p:cSld>
+    <p:spTree>
+      <p:nvGrpSpPr>
+        <p:cNvPr id="1" name=""/>
+        <p:cNvGrpSpPr/>
+        <p:nvPr/>
+      </p:nvGrpSpPr>
+      <p:grpSpPr>
+        <a:xfrm>
+          <a:off x="0" y="0"/>
+          <a:ext cx="0" cy="0"/>
+          <a:chOff x="0" y="0"/>
+          <a:chExt cx="0" cy="0"/>
+        </a:xfrm>
+      </p:grpSpPr>
+      <p:sp>
+        <p:nvSpPr>
+          <p:cNvPr id="2" name="Slide Image Placeholder 1"/>
+          <p:cNvSpPr>
+            <a:spLocks noGrp="1" noRot="1" noChangeAspect="1"/>
+          </p:cNvSpPr>
+          <p:nvPr>
+            <p:ph type="sldImg"/>
+          </p:nvPr>
+        </p:nvSpPr>
+        <p:spPr/>
+      </p:sp>
+      <p:sp>
+        <p:nvSpPr>
+          <p:cNvPr id="3" name="Notes Placeholder 2"/>
+          <p:cNvSpPr>
+            <a:spLocks noGrp="1"/>
+          </p:cNvSpPr>
+          <p:nvPr>
+            <p:ph type="body" idx="1"/>
+          </p:nvPr>
+        </p:nvSpPr>
+        <p:spPr/>
+        <p:txBody>
+          <a:bodyPr/>
+          <a:lstStyle/>
+          <a:p>
+            <a:endParaRPr lang="pl-PL" dirty="0"/>
+          </a:p>
+        </p:txBody>
+      </p:sp>
+      <p:sp>
+        <p:nvSpPr>
+          <p:cNvPr id="4" name="Slide Number Placeholder 3"/>
+          <p:cNvSpPr>
+            <a:spLocks noGrp="1"/>
+          </p:cNvSpPr>
+          <p:nvPr>
+            <p:ph type="sldNum" sz="quarter" idx="5"/>
+          </p:nvPr>
+        </p:nvSpPr>
+        <p:spPr/>
+        <p:txBody>
+          <a:bodyPr/>
+          <a:lstStyle/>
+          <a:p>
+            <a:fld id="{F89D2610-1426-4EFD-83D2-2399D4353A5D}" type="slidenum">
+              <a:rPr lang="pl-PL" smtClean="0"/>
+              <a:t>32</a:t>
             </a:fld>
             <a:endParaRPr lang="pl-PL"/>
           </a:p>
@@ -19157,39 +19245,6 @@
           <a:bodyPr/>
           <a:lstStyle/>
           <a:p>
-            <a:r>
-              <a:rPr lang="pl-PL" dirty="0"/>
-              <a:t>Szablon – Widok</a:t>
-            </a:r>
-          </a:p>
-          <a:p>
-            <a:r>
-              <a:rPr lang="pl-PL" dirty="0"/>
-              <a:t>Klasa – kod z </a:t>
-            </a:r>
-            <a:r>
-              <a:rPr lang="pl-PL" dirty="0" err="1"/>
-              <a:t>properties</a:t>
-            </a:r>
-            <a:r>
-              <a:rPr lang="pl-PL" dirty="0"/>
-              <a:t>, </a:t>
-            </a:r>
-            <a:r>
-              <a:rPr lang="pl-PL" dirty="0" err="1"/>
-              <a:t>methods</a:t>
-            </a:r>
-            <a:endParaRPr lang="pl-PL" dirty="0"/>
-          </a:p>
-          <a:p>
-            <a:r>
-              <a:rPr lang="pl-PL" dirty="0"/>
-              <a:t>Metadane - </a:t>
-            </a:r>
-            <a:r>
-              <a:rPr lang="pl-PL" dirty="0" err="1"/>
-              <a:t>dekoratory</a:t>
-            </a:r>
             <a:endParaRPr lang="pl-PL" dirty="0"/>
           </a:p>
         </p:txBody>
@@ -19211,7 +19266,7 @@
           <a:p>
             <a:fld id="{F89D2610-1426-4EFD-83D2-2399D4353A5D}" type="slidenum">
               <a:rPr lang="pl-PL" smtClean="0"/>
-              <a:t>13</a:t>
+              <a:t>12</a:t>
             </a:fld>
             <a:endParaRPr lang="pl-PL"/>
           </a:p>
@@ -19220,7 +19275,7 @@
     </p:spTree>
     <p:extLst>
       <p:ext uri="{BB962C8B-B14F-4D97-AF65-F5344CB8AC3E}">
-        <p14:creationId xmlns:p14="http://schemas.microsoft.com/office/powerpoint/2010/main" val="1447790036"/>
+        <p14:creationId xmlns:p14="http://schemas.microsoft.com/office/powerpoint/2010/main" val="3675294855"/>
       </p:ext>
     </p:extLst>
   </p:cSld>
@@ -19276,8 +19331,38 @@
           <a:p>
             <a:r>
               <a:rPr lang="pl-PL" dirty="0"/>
-              <a:t>Szczegółowe omówienie klasy</a:t>
-            </a:r>
+              <a:t>Szablon – Widok</a:t>
+            </a:r>
+          </a:p>
+          <a:p>
+            <a:r>
+              <a:rPr lang="pl-PL" dirty="0"/>
+              <a:t>Klasa – kod z </a:t>
+            </a:r>
+            <a:r>
+              <a:rPr lang="pl-PL" dirty="0" err="1"/>
+              <a:t>properties</a:t>
+            </a:r>
+            <a:r>
+              <a:rPr lang="pl-PL" dirty="0"/>
+              <a:t>, </a:t>
+            </a:r>
+            <a:r>
+              <a:rPr lang="pl-PL" dirty="0" err="1"/>
+              <a:t>methods</a:t>
+            </a:r>
+            <a:endParaRPr lang="pl-PL" dirty="0"/>
+          </a:p>
+          <a:p>
+            <a:r>
+              <a:rPr lang="pl-PL" dirty="0"/>
+              <a:t>Metadane - </a:t>
+            </a:r>
+            <a:r>
+              <a:rPr lang="pl-PL" dirty="0" err="1"/>
+              <a:t>dekoratory</a:t>
+            </a:r>
+            <a:endParaRPr lang="pl-PL" dirty="0"/>
           </a:p>
         </p:txBody>
       </p:sp>
@@ -19298,7 +19383,7 @@
           <a:p>
             <a:fld id="{F89D2610-1426-4EFD-83D2-2399D4353A5D}" type="slidenum">
               <a:rPr lang="pl-PL" smtClean="0"/>
-              <a:t>15</a:t>
+              <a:t>14</a:t>
             </a:fld>
             <a:endParaRPr lang="pl-PL"/>
           </a:p>
@@ -19307,7 +19392,7 @@
     </p:spTree>
     <p:extLst>
       <p:ext uri="{BB962C8B-B14F-4D97-AF65-F5344CB8AC3E}">
-        <p14:creationId xmlns:p14="http://schemas.microsoft.com/office/powerpoint/2010/main" val="3705693752"/>
+        <p14:creationId xmlns:p14="http://schemas.microsoft.com/office/powerpoint/2010/main" val="1447790036"/>
       </p:ext>
     </p:extLst>
   </p:cSld>
@@ -24780,6 +24865,233 @@
           <p:cNvPr id="2" name="Title 1">
             <a:extLst>
               <a:ext uri="{FF2B5EF4-FFF2-40B4-BE49-F238E27FC236}">
+                <a16:creationId xmlns:a16="http://schemas.microsoft.com/office/drawing/2014/main" id="{401AB415-193C-45D3-A459-EE91C2EF2AD1}"/>
+              </a:ext>
+            </a:extLst>
+          </p:cNvPr>
+          <p:cNvSpPr>
+            <a:spLocks noGrp="1"/>
+          </p:cNvSpPr>
+          <p:nvPr>
+            <p:ph type="title"/>
+          </p:nvPr>
+        </p:nvSpPr>
+        <p:spPr/>
+        <p:txBody>
+          <a:bodyPr/>
+          <a:lstStyle/>
+          <a:p>
+            <a:r>
+              <a:rPr lang="pl-PL" dirty="0"/>
+              <a:t>Upgrade do nowej wersji</a:t>
+            </a:r>
+          </a:p>
+        </p:txBody>
+      </p:sp>
+      <p:pic>
+        <p:nvPicPr>
+          <p:cNvPr id="4" name="Content Placeholder 3">
+            <a:extLst>
+              <a:ext uri="{FF2B5EF4-FFF2-40B4-BE49-F238E27FC236}">
+                <a16:creationId xmlns:a16="http://schemas.microsoft.com/office/drawing/2014/main" id="{DA48D402-BBF1-461C-A3BB-957744E0E047}"/>
+              </a:ext>
+            </a:extLst>
+          </p:cNvPr>
+          <p:cNvPicPr>
+            <a:picLocks noGrp="1" noChangeAspect="1"/>
+          </p:cNvPicPr>
+          <p:nvPr>
+            <p:ph idx="1"/>
+          </p:nvPr>
+        </p:nvPicPr>
+        <p:blipFill>
+          <a:blip r:embed="rId3"/>
+          <a:stretch>
+            <a:fillRect/>
+          </a:stretch>
+        </p:blipFill>
+        <p:spPr>
+          <a:xfrm>
+            <a:off x="1666218" y="1825625"/>
+            <a:ext cx="8859564" cy="4351338"/>
+          </a:xfrm>
+          <a:prstGeom prst="rect">
+            <a:avLst/>
+          </a:prstGeom>
+        </p:spPr>
+      </p:pic>
+      <p:sp>
+        <p:nvSpPr>
+          <p:cNvPr id="5" name="TextBox 4">
+            <a:extLst>
+              <a:ext uri="{FF2B5EF4-FFF2-40B4-BE49-F238E27FC236}">
+                <a16:creationId xmlns:a16="http://schemas.microsoft.com/office/drawing/2014/main" id="{3A81F552-FDA3-487C-A41D-D420D77B9E4A}"/>
+              </a:ext>
+            </a:extLst>
+          </p:cNvPr>
+          <p:cNvSpPr txBox="1"/>
+          <p:nvPr/>
+        </p:nvSpPr>
+        <p:spPr>
+          <a:xfrm>
+            <a:off x="883848" y="5866497"/>
+            <a:ext cx="10427480" cy="646331"/>
+          </a:xfrm>
+          <a:prstGeom prst="rect">
+            <a:avLst/>
+          </a:prstGeom>
+        </p:spPr>
+        <p:style>
+          <a:lnRef idx="2">
+            <a:schemeClr val="accent6">
+              <a:shade val="50000"/>
+            </a:schemeClr>
+          </a:lnRef>
+          <a:fillRef idx="1">
+            <a:schemeClr val="accent6"/>
+          </a:fillRef>
+          <a:effectRef idx="0">
+            <a:schemeClr val="accent6"/>
+          </a:effectRef>
+          <a:fontRef idx="minor">
+            <a:schemeClr val="lt1"/>
+          </a:fontRef>
+        </p:style>
+        <p:txBody>
+          <a:bodyPr wrap="square" rtlCol="0">
+            <a:spAutoFit/>
+          </a:bodyPr>
+          <a:lstStyle/>
+          <a:p>
+            <a:pPr algn="ctr"/>
+            <a:r>
+              <a:rPr lang="pl-PL" sz="3600" dirty="0"/>
+              <a:t>https://update.angular.io/</a:t>
+            </a:r>
+          </a:p>
+        </p:txBody>
+      </p:sp>
+    </p:spTree>
+    <p:extLst>
+      <p:ext uri="{BB962C8B-B14F-4D97-AF65-F5344CB8AC3E}">
+        <p14:creationId xmlns:p14="http://schemas.microsoft.com/office/powerpoint/2010/main" val="3345871085"/>
+      </p:ext>
+    </p:extLst>
+  </p:cSld>
+  <p:clrMapOvr>
+    <a:masterClrMapping/>
+  </p:clrMapOvr>
+  <p:timing>
+    <p:tnLst>
+      <p:par>
+        <p:cTn id="1" dur="indefinite" restart="never" nodeType="tmRoot">
+          <p:childTnLst>
+            <p:seq concurrent="1" nextAc="seek">
+              <p:cTn id="2" dur="indefinite" nodeType="mainSeq">
+                <p:childTnLst>
+                  <p:par>
+                    <p:cTn id="3" fill="hold">
+                      <p:stCondLst>
+                        <p:cond delay="indefinite"/>
+                      </p:stCondLst>
+                      <p:childTnLst>
+                        <p:par>
+                          <p:cTn id="4" fill="hold">
+                            <p:stCondLst>
+                              <p:cond delay="0"/>
+                            </p:stCondLst>
+                            <p:childTnLst>
+                              <p:par>
+                                <p:cTn id="5" presetID="10" presetClass="entr" presetSubtype="0" fill="hold" grpId="0" nodeType="clickEffect">
+                                  <p:stCondLst>
+                                    <p:cond delay="0"/>
+                                  </p:stCondLst>
+                                  <p:childTnLst>
+                                    <p:set>
+                                      <p:cBhvr>
+                                        <p:cTn id="6" dur="1" fill="hold">
+                                          <p:stCondLst>
+                                            <p:cond delay="0"/>
+                                          </p:stCondLst>
+                                        </p:cTn>
+                                        <p:tgtEl>
+                                          <p:spTgt spid="5"/>
+                                        </p:tgtEl>
+                                        <p:attrNameLst>
+                                          <p:attrName>style.visibility</p:attrName>
+                                        </p:attrNameLst>
+                                      </p:cBhvr>
+                                      <p:to>
+                                        <p:strVal val="visible"/>
+                                      </p:to>
+                                    </p:set>
+                                    <p:animEffect transition="in" filter="fade">
+                                      <p:cBhvr>
+                                        <p:cTn id="7" dur="500"/>
+                                        <p:tgtEl>
+                                          <p:spTgt spid="5"/>
+                                        </p:tgtEl>
+                                      </p:cBhvr>
+                                    </p:animEffect>
+                                  </p:childTnLst>
+                                </p:cTn>
+                              </p:par>
+                            </p:childTnLst>
+                          </p:cTn>
+                        </p:par>
+                      </p:childTnLst>
+                    </p:cTn>
+                  </p:par>
+                </p:childTnLst>
+              </p:cTn>
+              <p:prevCondLst>
+                <p:cond evt="onPrev" delay="0">
+                  <p:tgtEl>
+                    <p:sldTgt/>
+                  </p:tgtEl>
+                </p:cond>
+              </p:prevCondLst>
+              <p:nextCondLst>
+                <p:cond evt="onNext" delay="0">
+                  <p:tgtEl>
+                    <p:sldTgt/>
+                  </p:tgtEl>
+                </p:cond>
+              </p:nextCondLst>
+            </p:seq>
+          </p:childTnLst>
+        </p:cTn>
+      </p:par>
+    </p:tnLst>
+    <p:bldLst>
+      <p:bldP spid="5" grpId="0" animBg="1"/>
+    </p:bldLst>
+  </p:timing>
+</p:sld>
+</file>
+
+<file path=ppt/slides/slide13.xml><?xml version="1.0" encoding="utf-8"?>
+<p:sld xmlns:a="http://schemas.openxmlformats.org/drawingml/2006/main" xmlns:r="http://schemas.openxmlformats.org/officeDocument/2006/relationships" xmlns:p="http://schemas.openxmlformats.org/presentationml/2006/main">
+  <p:cSld>
+    <p:spTree>
+      <p:nvGrpSpPr>
+        <p:cNvPr id="1" name=""/>
+        <p:cNvGrpSpPr/>
+        <p:nvPr/>
+      </p:nvGrpSpPr>
+      <p:grpSpPr>
+        <a:xfrm>
+          <a:off x="0" y="0"/>
+          <a:ext cx="0" cy="0"/>
+          <a:chOff x="0" y="0"/>
+          <a:chExt cx="0" cy="0"/>
+        </a:xfrm>
+      </p:grpSpPr>
+      <p:sp>
+        <p:nvSpPr>
+          <p:cNvPr id="2" name="Title 1">
+            <a:extLst>
+              <a:ext uri="{FF2B5EF4-FFF2-40B4-BE49-F238E27FC236}">
                 <a16:creationId xmlns:a16="http://schemas.microsoft.com/office/drawing/2014/main" id="{DDDB1FD8-C8C7-4562-8CE9-949015807319}"/>
               </a:ext>
             </a:extLst>
@@ -25460,7 +25772,7 @@
 </p:sld>
 </file>
 
-<file path=ppt/slides/slide13.xml><?xml version="1.0" encoding="utf-8"?>
+<file path=ppt/slides/slide14.xml><?xml version="1.0" encoding="utf-8"?>
 <p:sld xmlns:a="http://schemas.openxmlformats.org/drawingml/2006/main" xmlns:r="http://schemas.openxmlformats.org/officeDocument/2006/relationships" xmlns:p="http://schemas.openxmlformats.org/presentationml/2006/main">
   <p:cSld>
     <p:spTree>
@@ -26666,7 +26978,7 @@
 </p:sld>
 </file>
 
-<file path=ppt/slides/slide14.xml><?xml version="1.0" encoding="utf-8"?>
+<file path=ppt/slides/slide15.xml><?xml version="1.0" encoding="utf-8"?>
 <p:sld xmlns:a="http://schemas.openxmlformats.org/drawingml/2006/main" xmlns:r="http://schemas.openxmlformats.org/officeDocument/2006/relationships" xmlns:p="http://schemas.openxmlformats.org/presentationml/2006/main">
   <p:cSld>
     <p:spTree>
@@ -26942,7 +27254,7 @@
 </p:sld>
 </file>
 
-<file path=ppt/slides/slide15.xml><?xml version="1.0" encoding="utf-8"?>
+<file path=ppt/slides/slide16.xml><?xml version="1.0" encoding="utf-8"?>
 <p:sld xmlns:a="http://schemas.openxmlformats.org/drawingml/2006/main" xmlns:r="http://schemas.openxmlformats.org/officeDocument/2006/relationships" xmlns:p="http://schemas.openxmlformats.org/presentationml/2006/main">
   <p:cSld>
     <p:spTree>
@@ -28020,7 +28332,7 @@
 </p:sld>
 </file>
 
-<file path=ppt/slides/slide16.xml><?xml version="1.0" encoding="utf-8"?>
+<file path=ppt/slides/slide17.xml><?xml version="1.0" encoding="utf-8"?>
 <p:sld xmlns:a="http://schemas.openxmlformats.org/drawingml/2006/main" xmlns:r="http://schemas.openxmlformats.org/officeDocument/2006/relationships" xmlns:p="http://schemas.openxmlformats.org/presentationml/2006/main">
   <p:cSld>
     <p:bg>
@@ -28443,7 +28755,7 @@
 </p:sld>
 </file>
 
-<file path=ppt/slides/slide17.xml><?xml version="1.0" encoding="utf-8"?>
+<file path=ppt/slides/slide18.xml><?xml version="1.0" encoding="utf-8"?>
 <p:sld xmlns:a="http://schemas.openxmlformats.org/drawingml/2006/main" xmlns:r="http://schemas.openxmlformats.org/officeDocument/2006/relationships" xmlns:p="http://schemas.openxmlformats.org/presentationml/2006/main">
   <p:cSld>
     <p:spTree>
@@ -29427,7 +29739,7 @@
 </p:sld>
 </file>
 
-<file path=ppt/slides/slide18.xml><?xml version="1.0" encoding="utf-8"?>
+<file path=ppt/slides/slide19.xml><?xml version="1.0" encoding="utf-8"?>
 <p:sld xmlns:a="http://schemas.openxmlformats.org/drawingml/2006/main" xmlns:r="http://schemas.openxmlformats.org/officeDocument/2006/relationships" xmlns:p="http://schemas.openxmlformats.org/presentationml/2006/main">
   <p:cSld>
     <p:spTree>
@@ -30237,7 +30549,148 @@
 </p:sld>
 </file>
 
-<file path=ppt/slides/slide19.xml><?xml version="1.0" encoding="utf-8"?>
+<file path=ppt/slides/slide2.xml><?xml version="1.0" encoding="utf-8"?>
+<p:sld xmlns:a="http://schemas.openxmlformats.org/drawingml/2006/main" xmlns:r="http://schemas.openxmlformats.org/officeDocument/2006/relationships" xmlns:p="http://schemas.openxmlformats.org/presentationml/2006/main">
+  <p:cSld>
+    <p:spTree>
+      <p:nvGrpSpPr>
+        <p:cNvPr id="1" name=""/>
+        <p:cNvGrpSpPr/>
+        <p:nvPr/>
+      </p:nvGrpSpPr>
+      <p:grpSpPr>
+        <a:xfrm>
+          <a:off x="0" y="0"/>
+          <a:ext cx="0" cy="0"/>
+          <a:chOff x="0" y="0"/>
+          <a:chExt cx="0" cy="0"/>
+        </a:xfrm>
+      </p:grpSpPr>
+      <p:sp>
+        <p:nvSpPr>
+          <p:cNvPr id="2" name="Title 1">
+            <a:extLst>
+              <a:ext uri="{FF2B5EF4-FFF2-40B4-BE49-F238E27FC236}">
+                <a16:creationId xmlns:a16="http://schemas.microsoft.com/office/drawing/2014/main" id="{EBC137FA-FA3A-44E8-8D57-B53FE7C88672}"/>
+              </a:ext>
+            </a:extLst>
+          </p:cNvPr>
+          <p:cNvSpPr>
+            <a:spLocks noGrp="1"/>
+          </p:cNvSpPr>
+          <p:nvPr>
+            <p:ph type="title"/>
+          </p:nvPr>
+        </p:nvSpPr>
+        <p:spPr/>
+        <p:txBody>
+          <a:bodyPr/>
+          <a:lstStyle/>
+          <a:p>
+            <a:r>
+              <a:rPr lang="pl-PL" dirty="0"/>
+              <a:t>Angular – co to jest?</a:t>
+            </a:r>
+          </a:p>
+        </p:txBody>
+      </p:sp>
+      <p:sp>
+        <p:nvSpPr>
+          <p:cNvPr id="5" name="Content Placeholder 4">
+            <a:extLst>
+              <a:ext uri="{FF2B5EF4-FFF2-40B4-BE49-F238E27FC236}">
+                <a16:creationId xmlns:a16="http://schemas.microsoft.com/office/drawing/2014/main" id="{9067A940-A1A4-4A9B-A4E7-76C2181539E2}"/>
+              </a:ext>
+            </a:extLst>
+          </p:cNvPr>
+          <p:cNvSpPr>
+            <a:spLocks noGrp="1"/>
+          </p:cNvSpPr>
+          <p:nvPr>
+            <p:ph sz="half" idx="2"/>
+          </p:nvPr>
+        </p:nvSpPr>
+        <p:spPr/>
+        <p:txBody>
+          <a:bodyPr/>
+          <a:lstStyle/>
+          <a:p>
+            <a:r>
+              <a:rPr lang="pl-PL" dirty="0"/>
+              <a:t>JavaScript framework</a:t>
+            </a:r>
+          </a:p>
+          <a:p>
+            <a:r>
+              <a:rPr lang="pl-PL" dirty="0"/>
+              <a:t>Aplikacje client-side</a:t>
+            </a:r>
+          </a:p>
+          <a:p>
+            <a:r>
+              <a:rPr lang="pl-PL" dirty="0"/>
+              <a:t>HTML, CSS i </a:t>
+            </a:r>
+            <a:r>
+              <a:rPr lang="pl-PL" dirty="0" err="1"/>
+              <a:t>TypeScript</a:t>
+            </a:r>
+            <a:endParaRPr lang="pl-PL" dirty="0"/>
+          </a:p>
+        </p:txBody>
+      </p:sp>
+      <p:pic>
+        <p:nvPicPr>
+          <p:cNvPr id="6" name="Content Placeholder 5">
+            <a:extLst>
+              <a:ext uri="{FF2B5EF4-FFF2-40B4-BE49-F238E27FC236}">
+                <a16:creationId xmlns:a16="http://schemas.microsoft.com/office/drawing/2014/main" id="{D68AE6CE-0922-4485-B2FB-ABF746948DF4}"/>
+              </a:ext>
+            </a:extLst>
+          </p:cNvPr>
+          <p:cNvPicPr>
+            <a:picLocks noGrp="1" noChangeAspect="1"/>
+          </p:cNvPicPr>
+          <p:nvPr>
+            <p:ph sz="half" idx="1"/>
+          </p:nvPr>
+        </p:nvPicPr>
+        <p:blipFill>
+          <a:blip r:embed="rId2">
+            <a:extLst>
+              <a:ext uri="{28A0092B-C50C-407E-A947-70E740481C1C}">
+                <a14:useLocalDpi xmlns:a14="http://schemas.microsoft.com/office/drawing/2010/main" val="0"/>
+              </a:ext>
+            </a:extLst>
+          </a:blip>
+          <a:stretch>
+            <a:fillRect/>
+          </a:stretch>
+        </p:blipFill>
+        <p:spPr>
+          <a:xfrm>
+            <a:off x="1514414" y="2086708"/>
+            <a:ext cx="3622429" cy="3622429"/>
+          </a:xfrm>
+          <a:prstGeom prst="rect">
+            <a:avLst/>
+          </a:prstGeom>
+        </p:spPr>
+      </p:pic>
+    </p:spTree>
+    <p:extLst>
+      <p:ext uri="{BB962C8B-B14F-4D97-AF65-F5344CB8AC3E}">
+        <p14:creationId xmlns:p14="http://schemas.microsoft.com/office/powerpoint/2010/main" val="1159982067"/>
+      </p:ext>
+    </p:extLst>
+  </p:cSld>
+  <p:clrMapOvr>
+    <a:masterClrMapping/>
+  </p:clrMapOvr>
+</p:sld>
+</file>
+
+<file path=ppt/slides/slide20.xml><?xml version="1.0" encoding="utf-8"?>
 <p:sld xmlns:a="http://schemas.openxmlformats.org/drawingml/2006/main" xmlns:r="http://schemas.openxmlformats.org/officeDocument/2006/relationships" xmlns:p="http://schemas.openxmlformats.org/presentationml/2006/main">
   <p:cSld>
     <p:spTree>
@@ -30922,148 +31375,7 @@
 </p:sld>
 </file>
 
-<file path=ppt/slides/slide2.xml><?xml version="1.0" encoding="utf-8"?>
-<p:sld xmlns:a="http://schemas.openxmlformats.org/drawingml/2006/main" xmlns:r="http://schemas.openxmlformats.org/officeDocument/2006/relationships" xmlns:p="http://schemas.openxmlformats.org/presentationml/2006/main">
-  <p:cSld>
-    <p:spTree>
-      <p:nvGrpSpPr>
-        <p:cNvPr id="1" name=""/>
-        <p:cNvGrpSpPr/>
-        <p:nvPr/>
-      </p:nvGrpSpPr>
-      <p:grpSpPr>
-        <a:xfrm>
-          <a:off x="0" y="0"/>
-          <a:ext cx="0" cy="0"/>
-          <a:chOff x="0" y="0"/>
-          <a:chExt cx="0" cy="0"/>
-        </a:xfrm>
-      </p:grpSpPr>
-      <p:sp>
-        <p:nvSpPr>
-          <p:cNvPr id="2" name="Title 1">
-            <a:extLst>
-              <a:ext uri="{FF2B5EF4-FFF2-40B4-BE49-F238E27FC236}">
-                <a16:creationId xmlns:a16="http://schemas.microsoft.com/office/drawing/2014/main" id="{EBC137FA-FA3A-44E8-8D57-B53FE7C88672}"/>
-              </a:ext>
-            </a:extLst>
-          </p:cNvPr>
-          <p:cNvSpPr>
-            <a:spLocks noGrp="1"/>
-          </p:cNvSpPr>
-          <p:nvPr>
-            <p:ph type="title"/>
-          </p:nvPr>
-        </p:nvSpPr>
-        <p:spPr/>
-        <p:txBody>
-          <a:bodyPr/>
-          <a:lstStyle/>
-          <a:p>
-            <a:r>
-              <a:rPr lang="pl-PL" dirty="0"/>
-              <a:t>Angular – co to jest?</a:t>
-            </a:r>
-          </a:p>
-        </p:txBody>
-      </p:sp>
-      <p:sp>
-        <p:nvSpPr>
-          <p:cNvPr id="5" name="Content Placeholder 4">
-            <a:extLst>
-              <a:ext uri="{FF2B5EF4-FFF2-40B4-BE49-F238E27FC236}">
-                <a16:creationId xmlns:a16="http://schemas.microsoft.com/office/drawing/2014/main" id="{9067A940-A1A4-4A9B-A4E7-76C2181539E2}"/>
-              </a:ext>
-            </a:extLst>
-          </p:cNvPr>
-          <p:cNvSpPr>
-            <a:spLocks noGrp="1"/>
-          </p:cNvSpPr>
-          <p:nvPr>
-            <p:ph sz="half" idx="2"/>
-          </p:nvPr>
-        </p:nvSpPr>
-        <p:spPr/>
-        <p:txBody>
-          <a:bodyPr/>
-          <a:lstStyle/>
-          <a:p>
-            <a:r>
-              <a:rPr lang="pl-PL" dirty="0"/>
-              <a:t>JavaScript framework</a:t>
-            </a:r>
-          </a:p>
-          <a:p>
-            <a:r>
-              <a:rPr lang="pl-PL" dirty="0"/>
-              <a:t>Aplikacje client-side</a:t>
-            </a:r>
-          </a:p>
-          <a:p>
-            <a:r>
-              <a:rPr lang="pl-PL" dirty="0"/>
-              <a:t>HTML, CSS i </a:t>
-            </a:r>
-            <a:r>
-              <a:rPr lang="pl-PL" dirty="0" err="1"/>
-              <a:t>TypeScript</a:t>
-            </a:r>
-            <a:endParaRPr lang="pl-PL" dirty="0"/>
-          </a:p>
-        </p:txBody>
-      </p:sp>
-      <p:pic>
-        <p:nvPicPr>
-          <p:cNvPr id="6" name="Content Placeholder 5">
-            <a:extLst>
-              <a:ext uri="{FF2B5EF4-FFF2-40B4-BE49-F238E27FC236}">
-                <a16:creationId xmlns:a16="http://schemas.microsoft.com/office/drawing/2014/main" id="{D68AE6CE-0922-4485-B2FB-ABF746948DF4}"/>
-              </a:ext>
-            </a:extLst>
-          </p:cNvPr>
-          <p:cNvPicPr>
-            <a:picLocks noGrp="1" noChangeAspect="1"/>
-          </p:cNvPicPr>
-          <p:nvPr>
-            <p:ph sz="half" idx="1"/>
-          </p:nvPr>
-        </p:nvPicPr>
-        <p:blipFill>
-          <a:blip r:embed="rId2">
-            <a:extLst>
-              <a:ext uri="{28A0092B-C50C-407E-A947-70E740481C1C}">
-                <a14:useLocalDpi xmlns:a14="http://schemas.microsoft.com/office/drawing/2010/main" val="0"/>
-              </a:ext>
-            </a:extLst>
-          </a:blip>
-          <a:stretch>
-            <a:fillRect/>
-          </a:stretch>
-        </p:blipFill>
-        <p:spPr>
-          <a:xfrm>
-            <a:off x="1514414" y="2086708"/>
-            <a:ext cx="3622429" cy="3622429"/>
-          </a:xfrm>
-          <a:prstGeom prst="rect">
-            <a:avLst/>
-          </a:prstGeom>
-        </p:spPr>
-      </p:pic>
-    </p:spTree>
-    <p:extLst>
-      <p:ext uri="{BB962C8B-B14F-4D97-AF65-F5344CB8AC3E}">
-        <p14:creationId xmlns:p14="http://schemas.microsoft.com/office/powerpoint/2010/main" val="1159982067"/>
-      </p:ext>
-    </p:extLst>
-  </p:cSld>
-  <p:clrMapOvr>
-    <a:masterClrMapping/>
-  </p:clrMapOvr>
-</p:sld>
-</file>
-
-<file path=ppt/slides/slide20.xml><?xml version="1.0" encoding="utf-8"?>
+<file path=ppt/slides/slide21.xml><?xml version="1.0" encoding="utf-8"?>
 <p:sld xmlns:a="http://schemas.openxmlformats.org/drawingml/2006/main" xmlns:r="http://schemas.openxmlformats.org/officeDocument/2006/relationships" xmlns:p="http://schemas.openxmlformats.org/presentationml/2006/main">
   <p:cSld>
     <p:bg>
@@ -31568,7 +31880,7 @@
 </p:sld>
 </file>
 
-<file path=ppt/slides/slide21.xml><?xml version="1.0" encoding="utf-8"?>
+<file path=ppt/slides/slide22.xml><?xml version="1.0" encoding="utf-8"?>
 <p:sld xmlns:a="http://schemas.openxmlformats.org/drawingml/2006/main" xmlns:r="http://schemas.openxmlformats.org/officeDocument/2006/relationships" xmlns:p="http://schemas.openxmlformats.org/presentationml/2006/main">
   <p:cSld>
     <p:spTree>
@@ -33030,7 +33342,7 @@
 </p:sld>
 </file>
 
-<file path=ppt/slides/slide22.xml><?xml version="1.0" encoding="utf-8"?>
+<file path=ppt/slides/slide23.xml><?xml version="1.0" encoding="utf-8"?>
 <p:sld xmlns:a="http://schemas.openxmlformats.org/drawingml/2006/main" xmlns:r="http://schemas.openxmlformats.org/officeDocument/2006/relationships" xmlns:p="http://schemas.openxmlformats.org/presentationml/2006/main">
   <p:cSld>
     <p:bg>
@@ -33458,7 +33770,7 @@
 </p:sld>
 </file>
 
-<file path=ppt/slides/slide23.xml><?xml version="1.0" encoding="utf-8"?>
+<file path=ppt/slides/slide24.xml><?xml version="1.0" encoding="utf-8"?>
 <p:sld xmlns:a="http://schemas.openxmlformats.org/drawingml/2006/main" xmlns:r="http://schemas.openxmlformats.org/officeDocument/2006/relationships" xmlns:p="http://schemas.openxmlformats.org/presentationml/2006/main">
   <p:cSld>
     <p:spTree>
@@ -34506,7 +34818,7 @@
 </p:sld>
 </file>
 
-<file path=ppt/slides/slide24.xml><?xml version="1.0" encoding="utf-8"?>
+<file path=ppt/slides/slide25.xml><?xml version="1.0" encoding="utf-8"?>
 <p:sld xmlns:a="http://schemas.openxmlformats.org/drawingml/2006/main" xmlns:r="http://schemas.openxmlformats.org/officeDocument/2006/relationships" xmlns:p="http://schemas.openxmlformats.org/presentationml/2006/main">
   <p:cSld>
     <p:bg>
@@ -35043,7 +35355,7 @@
 </p:sld>
 </file>
 
-<file path=ppt/slides/slide25.xml><?xml version="1.0" encoding="utf-8"?>
+<file path=ppt/slides/slide26.xml><?xml version="1.0" encoding="utf-8"?>
 <p:sld xmlns:a="http://schemas.openxmlformats.org/drawingml/2006/main" xmlns:r="http://schemas.openxmlformats.org/officeDocument/2006/relationships" xmlns:p="http://schemas.openxmlformats.org/presentationml/2006/main">
   <p:cSld>
     <p:spTree>
@@ -35406,7 +35718,7 @@
 </p:sld>
 </file>
 
-<file path=ppt/slides/slide26.xml><?xml version="1.0" encoding="utf-8"?>
+<file path=ppt/slides/slide27.xml><?xml version="1.0" encoding="utf-8"?>
 <p:sld xmlns:a="http://schemas.openxmlformats.org/drawingml/2006/main" xmlns:r="http://schemas.openxmlformats.org/officeDocument/2006/relationships" xmlns:p="http://schemas.openxmlformats.org/presentationml/2006/main">
   <p:cSld>
     <p:spTree>
@@ -37010,7 +37322,7 @@
 </p:sld>
 </file>
 
-<file path=ppt/slides/slide27.xml><?xml version="1.0" encoding="utf-8"?>
+<file path=ppt/slides/slide28.xml><?xml version="1.0" encoding="utf-8"?>
 <p:sld xmlns:a="http://schemas.openxmlformats.org/drawingml/2006/main" xmlns:r="http://schemas.openxmlformats.org/officeDocument/2006/relationships" xmlns:p="http://schemas.openxmlformats.org/presentationml/2006/main">
   <p:cSld>
     <p:spTree>
@@ -37565,7 +37877,7 @@
 </p:sld>
 </file>
 
-<file path=ppt/slides/slide28.xml><?xml version="1.0" encoding="utf-8"?>
+<file path=ppt/slides/slide29.xml><?xml version="1.0" encoding="utf-8"?>
 <p:sld xmlns:a="http://schemas.openxmlformats.org/drawingml/2006/main" xmlns:r="http://schemas.openxmlformats.org/officeDocument/2006/relationships" xmlns:p="http://schemas.openxmlformats.org/presentationml/2006/main">
   <p:cSld>
     <p:spTree>
@@ -38434,189 +38746,6 @@
       </p:par>
     </p:tnLst>
   </p:timing>
-</p:sld>
-</file>
-
-<file path=ppt/slides/slide29.xml><?xml version="1.0" encoding="utf-8"?>
-<p:sld xmlns:a="http://schemas.openxmlformats.org/drawingml/2006/main" xmlns:r="http://schemas.openxmlformats.org/officeDocument/2006/relationships" xmlns:p="http://schemas.openxmlformats.org/presentationml/2006/main">
-  <p:cSld>
-    <p:spTree>
-      <p:nvGrpSpPr>
-        <p:cNvPr id="1" name=""/>
-        <p:cNvGrpSpPr/>
-        <p:nvPr/>
-      </p:nvGrpSpPr>
-      <p:grpSpPr>
-        <a:xfrm>
-          <a:off x="0" y="0"/>
-          <a:ext cx="0" cy="0"/>
-          <a:chOff x="0" y="0"/>
-          <a:chExt cx="0" cy="0"/>
-        </a:xfrm>
-      </p:grpSpPr>
-      <p:sp>
-        <p:nvSpPr>
-          <p:cNvPr id="2" name="Title 1">
-            <a:extLst>
-              <a:ext uri="{FF2B5EF4-FFF2-40B4-BE49-F238E27FC236}">
-                <a16:creationId xmlns:a16="http://schemas.microsoft.com/office/drawing/2014/main" id="{459C012F-9222-4FAD-867A-62460861A8F2}"/>
-              </a:ext>
-            </a:extLst>
-          </p:cNvPr>
-          <p:cNvSpPr>
-            <a:spLocks noGrp="1"/>
-          </p:cNvSpPr>
-          <p:nvPr>
-            <p:ph type="title"/>
-          </p:nvPr>
-        </p:nvSpPr>
-        <p:spPr/>
-        <p:txBody>
-          <a:bodyPr/>
-          <a:lstStyle/>
-          <a:p>
-            <a:r>
-              <a:rPr lang="pl-PL" dirty="0"/>
-              <a:t>Zadanie domowe</a:t>
-            </a:r>
-          </a:p>
-        </p:txBody>
-      </p:sp>
-      <p:sp>
-        <p:nvSpPr>
-          <p:cNvPr id="3" name="Content Placeholder 2">
-            <a:extLst>
-              <a:ext uri="{FF2B5EF4-FFF2-40B4-BE49-F238E27FC236}">
-                <a16:creationId xmlns:a16="http://schemas.microsoft.com/office/drawing/2014/main" id="{D2857A11-D4FF-4E04-AAB3-3AF752C4FF03}"/>
-              </a:ext>
-            </a:extLst>
-          </p:cNvPr>
-          <p:cNvSpPr>
-            <a:spLocks noGrp="1"/>
-          </p:cNvSpPr>
-          <p:nvPr>
-            <p:ph sz="half" idx="1"/>
-          </p:nvPr>
-        </p:nvSpPr>
-        <p:spPr/>
-        <p:txBody>
-          <a:bodyPr/>
-          <a:lstStyle/>
-          <a:p>
-            <a:r>
-              <a:rPr lang="pl-PL" dirty="0"/>
-              <a:t>Stwórz pasek nawigacyjny w naszej aplikacji</a:t>
-            </a:r>
-          </a:p>
-          <a:p>
-            <a:pPr lvl="1"/>
-            <a:r>
-              <a:rPr lang="pl-PL" dirty="0"/>
-              <a:t>Nowy komponent </a:t>
-            </a:r>
-            <a:r>
-              <a:rPr lang="pl-PL" dirty="0" err="1"/>
-              <a:t>NavBarComponent</a:t>
-            </a:r>
-            <a:r>
-              <a:rPr lang="pl-PL" dirty="0"/>
-              <a:t> (</a:t>
-            </a:r>
-            <a:r>
-              <a:rPr lang="pl-PL" dirty="0" err="1"/>
-              <a:t>AngularCLI</a:t>
-            </a:r>
-            <a:r>
-              <a:rPr lang="pl-PL" dirty="0"/>
-              <a:t>)</a:t>
-            </a:r>
-          </a:p>
-          <a:p>
-            <a:pPr lvl="1"/>
-            <a:r>
-              <a:rPr lang="pl-PL" dirty="0"/>
-              <a:t>Użycie klasy </a:t>
-            </a:r>
-            <a:r>
-              <a:rPr lang="pl-PL" dirty="0" err="1"/>
-              <a:t>Bootstrap</a:t>
-            </a:r>
-            <a:r>
-              <a:rPr lang="pl-PL" dirty="0"/>
-              <a:t> </a:t>
-            </a:r>
-            <a:r>
-              <a:rPr lang="pl-PL" dirty="0" err="1">
-                <a:hlinkClick r:id="rId2"/>
-              </a:rPr>
-              <a:t>Navbar</a:t>
-            </a:r>
-            <a:endParaRPr lang="pl-PL" dirty="0"/>
-          </a:p>
-          <a:p>
-            <a:pPr lvl="1"/>
-            <a:r>
-              <a:rPr lang="pl-PL"/>
-              <a:t>Dodanie przycisków</a:t>
-            </a:r>
-            <a:endParaRPr lang="pl-PL" dirty="0"/>
-          </a:p>
-        </p:txBody>
-      </p:sp>
-      <p:pic>
-        <p:nvPicPr>
-          <p:cNvPr id="6" name="Content Placeholder 5">
-            <a:extLst>
-              <a:ext uri="{FF2B5EF4-FFF2-40B4-BE49-F238E27FC236}">
-                <a16:creationId xmlns:a16="http://schemas.microsoft.com/office/drawing/2014/main" id="{A291C965-85F7-48EF-8BD3-9C6FF66F08A5}"/>
-              </a:ext>
-            </a:extLst>
-          </p:cNvPr>
-          <p:cNvPicPr>
-            <a:picLocks noGrp="1" noChangeAspect="1"/>
-          </p:cNvPicPr>
-          <p:nvPr>
-            <p:ph sz="half" idx="2"/>
-          </p:nvPr>
-        </p:nvPicPr>
-        <p:blipFill>
-          <a:blip r:embed="rId3"/>
-          <a:stretch>
-            <a:fillRect/>
-          </a:stretch>
-        </p:blipFill>
-        <p:spPr>
-          <a:xfrm>
-            <a:off x="6172202" y="1771889"/>
-            <a:ext cx="5181600" cy="3314221"/>
-          </a:xfrm>
-          <a:prstGeom prst="rect">
-            <a:avLst/>
-          </a:prstGeom>
-        </p:spPr>
-      </p:pic>
-    </p:spTree>
-    <p:extLst>
-      <p:ext uri="{BB962C8B-B14F-4D97-AF65-F5344CB8AC3E}">
-        <p14:creationId xmlns:p14="http://schemas.microsoft.com/office/powerpoint/2010/main" val="3586487894"/>
-      </p:ext>
-    </p:extLst>
-  </p:cSld>
-  <p:clrMapOvr>
-    <a:masterClrMapping/>
-  </p:clrMapOvr>
-  <mc:AlternateContent xmlns:mc="http://schemas.openxmlformats.org/markup-compatibility/2006">
-    <mc:Choice xmlns:p159="http://schemas.microsoft.com/office/powerpoint/2015/09/main" Requires="p159">
-      <p:transition xmlns:p14="http://schemas.microsoft.com/office/powerpoint/2010/main" spd="slow" p14:dur="2000">
-        <p159:morph option="byObject"/>
-      </p:transition>
-    </mc:Choice>
-    <mc:Fallback>
-      <p:transition spd="slow">
-        <p:fade/>
-      </p:transition>
-    </mc:Fallback>
-  </mc:AlternateContent>
 </p:sld>
 </file>
 
@@ -39584,6 +39713,189 @@
           <p:cNvPr id="2" name="Title 1">
             <a:extLst>
               <a:ext uri="{FF2B5EF4-FFF2-40B4-BE49-F238E27FC236}">
+                <a16:creationId xmlns:a16="http://schemas.microsoft.com/office/drawing/2014/main" id="{459C012F-9222-4FAD-867A-62460861A8F2}"/>
+              </a:ext>
+            </a:extLst>
+          </p:cNvPr>
+          <p:cNvSpPr>
+            <a:spLocks noGrp="1"/>
+          </p:cNvSpPr>
+          <p:nvPr>
+            <p:ph type="title"/>
+          </p:nvPr>
+        </p:nvSpPr>
+        <p:spPr/>
+        <p:txBody>
+          <a:bodyPr/>
+          <a:lstStyle/>
+          <a:p>
+            <a:r>
+              <a:rPr lang="pl-PL" dirty="0"/>
+              <a:t>Zadanie domowe</a:t>
+            </a:r>
+          </a:p>
+        </p:txBody>
+      </p:sp>
+      <p:sp>
+        <p:nvSpPr>
+          <p:cNvPr id="3" name="Content Placeholder 2">
+            <a:extLst>
+              <a:ext uri="{FF2B5EF4-FFF2-40B4-BE49-F238E27FC236}">
+                <a16:creationId xmlns:a16="http://schemas.microsoft.com/office/drawing/2014/main" id="{D2857A11-D4FF-4E04-AAB3-3AF752C4FF03}"/>
+              </a:ext>
+            </a:extLst>
+          </p:cNvPr>
+          <p:cNvSpPr>
+            <a:spLocks noGrp="1"/>
+          </p:cNvSpPr>
+          <p:nvPr>
+            <p:ph sz="half" idx="1"/>
+          </p:nvPr>
+        </p:nvSpPr>
+        <p:spPr/>
+        <p:txBody>
+          <a:bodyPr/>
+          <a:lstStyle/>
+          <a:p>
+            <a:r>
+              <a:rPr lang="pl-PL" dirty="0"/>
+              <a:t>Stwórz pasek nawigacyjny w naszej aplikacji</a:t>
+            </a:r>
+          </a:p>
+          <a:p>
+            <a:pPr lvl="1"/>
+            <a:r>
+              <a:rPr lang="pl-PL" dirty="0"/>
+              <a:t>Nowy komponent </a:t>
+            </a:r>
+            <a:r>
+              <a:rPr lang="pl-PL" dirty="0" err="1"/>
+              <a:t>NavBarComponent</a:t>
+            </a:r>
+            <a:r>
+              <a:rPr lang="pl-PL" dirty="0"/>
+              <a:t> (</a:t>
+            </a:r>
+            <a:r>
+              <a:rPr lang="pl-PL" dirty="0" err="1"/>
+              <a:t>AngularCLI</a:t>
+            </a:r>
+            <a:r>
+              <a:rPr lang="pl-PL" dirty="0"/>
+              <a:t>)</a:t>
+            </a:r>
+          </a:p>
+          <a:p>
+            <a:pPr lvl="1"/>
+            <a:r>
+              <a:rPr lang="pl-PL" dirty="0"/>
+              <a:t>Użycie klasy </a:t>
+            </a:r>
+            <a:r>
+              <a:rPr lang="pl-PL" dirty="0" err="1"/>
+              <a:t>Bootstrap</a:t>
+            </a:r>
+            <a:r>
+              <a:rPr lang="pl-PL" dirty="0"/>
+              <a:t> </a:t>
+            </a:r>
+            <a:r>
+              <a:rPr lang="pl-PL" dirty="0" err="1">
+                <a:hlinkClick r:id="rId2"/>
+              </a:rPr>
+              <a:t>Navbar</a:t>
+            </a:r>
+            <a:endParaRPr lang="pl-PL" dirty="0"/>
+          </a:p>
+          <a:p>
+            <a:pPr lvl="1"/>
+            <a:r>
+              <a:rPr lang="pl-PL"/>
+              <a:t>Dodanie przycisków</a:t>
+            </a:r>
+            <a:endParaRPr lang="pl-PL" dirty="0"/>
+          </a:p>
+        </p:txBody>
+      </p:sp>
+      <p:pic>
+        <p:nvPicPr>
+          <p:cNvPr id="6" name="Content Placeholder 5">
+            <a:extLst>
+              <a:ext uri="{FF2B5EF4-FFF2-40B4-BE49-F238E27FC236}">
+                <a16:creationId xmlns:a16="http://schemas.microsoft.com/office/drawing/2014/main" id="{A291C965-85F7-48EF-8BD3-9C6FF66F08A5}"/>
+              </a:ext>
+            </a:extLst>
+          </p:cNvPr>
+          <p:cNvPicPr>
+            <a:picLocks noGrp="1" noChangeAspect="1"/>
+          </p:cNvPicPr>
+          <p:nvPr>
+            <p:ph sz="half" idx="2"/>
+          </p:nvPr>
+        </p:nvPicPr>
+        <p:blipFill>
+          <a:blip r:embed="rId3"/>
+          <a:stretch>
+            <a:fillRect/>
+          </a:stretch>
+        </p:blipFill>
+        <p:spPr>
+          <a:xfrm>
+            <a:off x="6172202" y="1771889"/>
+            <a:ext cx="5181600" cy="3314221"/>
+          </a:xfrm>
+          <a:prstGeom prst="rect">
+            <a:avLst/>
+          </a:prstGeom>
+        </p:spPr>
+      </p:pic>
+    </p:spTree>
+    <p:extLst>
+      <p:ext uri="{BB962C8B-B14F-4D97-AF65-F5344CB8AC3E}">
+        <p14:creationId xmlns:p14="http://schemas.microsoft.com/office/powerpoint/2010/main" val="3586487894"/>
+      </p:ext>
+    </p:extLst>
+  </p:cSld>
+  <p:clrMapOvr>
+    <a:masterClrMapping/>
+  </p:clrMapOvr>
+  <mc:AlternateContent xmlns:mc="http://schemas.openxmlformats.org/markup-compatibility/2006" xmlns:p159="http://schemas.microsoft.com/office/powerpoint/2015/09/main">
+    <mc:Choice Requires="p159">
+      <p:transition xmlns:p14="http://schemas.microsoft.com/office/powerpoint/2010/main" spd="slow" p14:dur="2000">
+        <p159:morph option="byObject"/>
+      </p:transition>
+    </mc:Choice>
+    <mc:Fallback xmlns="">
+      <p:transition spd="slow">
+        <p:fade/>
+      </p:transition>
+    </mc:Fallback>
+  </mc:AlternateContent>
+</p:sld>
+</file>
+
+<file path=ppt/slides/slide31.xml><?xml version="1.0" encoding="utf-8"?>
+<p:sld xmlns:a="http://schemas.openxmlformats.org/drawingml/2006/main" xmlns:r="http://schemas.openxmlformats.org/officeDocument/2006/relationships" xmlns:p="http://schemas.openxmlformats.org/presentationml/2006/main">
+  <p:cSld>
+    <p:spTree>
+      <p:nvGrpSpPr>
+        <p:cNvPr id="1" name=""/>
+        <p:cNvGrpSpPr/>
+        <p:nvPr/>
+      </p:nvGrpSpPr>
+      <p:grpSpPr>
+        <a:xfrm>
+          <a:off x="0" y="0"/>
+          <a:ext cx="0" cy="0"/>
+          <a:chOff x="0" y="0"/>
+          <a:chExt cx="0" cy="0"/>
+        </a:xfrm>
+      </p:grpSpPr>
+      <p:sp>
+        <p:nvSpPr>
+          <p:cNvPr id="2" name="Title 1">
+            <a:extLst>
+              <a:ext uri="{FF2B5EF4-FFF2-40B4-BE49-F238E27FC236}">
                 <a16:creationId xmlns:a16="http://schemas.microsoft.com/office/drawing/2014/main" id="{C4CFC0B9-A04C-4020-A168-46C6CD035C0B}"/>
               </a:ext>
             </a:extLst>
@@ -39892,13 +40204,13 @@
   <p:clrMapOvr>
     <a:masterClrMapping/>
   </p:clrMapOvr>
-  <mc:AlternateContent xmlns:mc="http://schemas.openxmlformats.org/markup-compatibility/2006">
-    <mc:Choice xmlns:p159="http://schemas.microsoft.com/office/powerpoint/2015/09/main" Requires="p159">
+  <mc:AlternateContent xmlns:mc="http://schemas.openxmlformats.org/markup-compatibility/2006" xmlns:p159="http://schemas.microsoft.com/office/powerpoint/2015/09/main">
+    <mc:Choice Requires="p159">
       <p:transition xmlns:p14="http://schemas.microsoft.com/office/powerpoint/2010/main" spd="slow" p14:dur="2000">
         <p159:morph option="byObject"/>
       </p:transition>
     </mc:Choice>
-    <mc:Fallback>
+    <mc:Fallback xmlns="">
       <p:transition spd="slow">
         <p:fade/>
       </p:transition>
@@ -39907,7 +40219,7 @@
 </p:sld>
 </file>
 
-<file path=ppt/slides/slide31.xml><?xml version="1.0" encoding="utf-8"?>
+<file path=ppt/slides/slide32.xml><?xml version="1.0" encoding="utf-8"?>
 <p:sld xmlns:a="http://schemas.openxmlformats.org/drawingml/2006/main" xmlns:r="http://schemas.openxmlformats.org/officeDocument/2006/relationships" xmlns:p="http://schemas.openxmlformats.org/presentationml/2006/main">
   <p:cSld>
     <p:spTree>
@@ -40095,13 +40407,13 @@
   <p:clrMapOvr>
     <a:masterClrMapping/>
   </p:clrMapOvr>
-  <mc:AlternateContent xmlns:mc="http://schemas.openxmlformats.org/markup-compatibility/2006">
-    <mc:Choice xmlns:p159="http://schemas.microsoft.com/office/powerpoint/2015/09/main" Requires="p159">
+  <mc:AlternateContent xmlns:mc="http://schemas.openxmlformats.org/markup-compatibility/2006" xmlns:p159="http://schemas.microsoft.com/office/powerpoint/2015/09/main">
+    <mc:Choice Requires="p159">
       <p:transition xmlns:p14="http://schemas.microsoft.com/office/powerpoint/2010/main" spd="slow" p14:dur="2000">
         <p159:morph option="byObject"/>
       </p:transition>
     </mc:Choice>
-    <mc:Fallback>
+    <mc:Fallback xmlns="">
       <p:transition spd="slow">
         <p:fade/>
       </p:transition>

</xml_diff>